<commit_message>
Alteração da apresentação/relatório final (alterações nos elementos do grupo)
</commit_message>
<xml_diff>
--- a/ApresentacaoRelatorio_PSI_GeneticLAB.pptx
+++ b/ApresentacaoRelatorio_PSI_GeneticLAB.pptx
@@ -291,7 +291,7 @@
           <a:p>
             <a:fld id="{EDD44D33-DDD1-4541-B882-E9A9CC0E7DF4}" type="datetimeFigureOut">
               <a:rPr lang="pt-PT" smtClean="0"/>
-              <a:t>25-05-2012</a:t>
+              <a:t>28-05-2012</a:t>
             </a:fld>
             <a:endParaRPr lang="pt-PT"/>
           </a:p>
@@ -461,7 +461,7 @@
           <a:p>
             <a:fld id="{EDD44D33-DDD1-4541-B882-E9A9CC0E7DF4}" type="datetimeFigureOut">
               <a:rPr lang="pt-PT" smtClean="0"/>
-              <a:t>25-05-2012</a:t>
+              <a:t>28-05-2012</a:t>
             </a:fld>
             <a:endParaRPr lang="pt-PT"/>
           </a:p>
@@ -641,7 +641,7 @@
           <a:p>
             <a:fld id="{EDD44D33-DDD1-4541-B882-E9A9CC0E7DF4}" type="datetimeFigureOut">
               <a:rPr lang="pt-PT" smtClean="0"/>
-              <a:t>25-05-2012</a:t>
+              <a:t>28-05-2012</a:t>
             </a:fld>
             <a:endParaRPr lang="pt-PT"/>
           </a:p>
@@ -811,7 +811,7 @@
           <a:p>
             <a:fld id="{EDD44D33-DDD1-4541-B882-E9A9CC0E7DF4}" type="datetimeFigureOut">
               <a:rPr lang="pt-PT" smtClean="0"/>
-              <a:t>25-05-2012</a:t>
+              <a:t>28-05-2012</a:t>
             </a:fld>
             <a:endParaRPr lang="pt-PT"/>
           </a:p>
@@ -1057,7 +1057,7 @@
           <a:p>
             <a:fld id="{EDD44D33-DDD1-4541-B882-E9A9CC0E7DF4}" type="datetimeFigureOut">
               <a:rPr lang="pt-PT" smtClean="0"/>
-              <a:t>25-05-2012</a:t>
+              <a:t>28-05-2012</a:t>
             </a:fld>
             <a:endParaRPr lang="pt-PT"/>
           </a:p>
@@ -1345,7 +1345,7 @@
           <a:p>
             <a:fld id="{EDD44D33-DDD1-4541-B882-E9A9CC0E7DF4}" type="datetimeFigureOut">
               <a:rPr lang="pt-PT" smtClean="0"/>
-              <a:t>25-05-2012</a:t>
+              <a:t>28-05-2012</a:t>
             </a:fld>
             <a:endParaRPr lang="pt-PT"/>
           </a:p>
@@ -1767,7 +1767,7 @@
           <a:p>
             <a:fld id="{EDD44D33-DDD1-4541-B882-E9A9CC0E7DF4}" type="datetimeFigureOut">
               <a:rPr lang="pt-PT" smtClean="0"/>
-              <a:t>25-05-2012</a:t>
+              <a:t>28-05-2012</a:t>
             </a:fld>
             <a:endParaRPr lang="pt-PT"/>
           </a:p>
@@ -1885,7 +1885,7 @@
           <a:p>
             <a:fld id="{EDD44D33-DDD1-4541-B882-E9A9CC0E7DF4}" type="datetimeFigureOut">
               <a:rPr lang="pt-PT" smtClean="0"/>
-              <a:t>25-05-2012</a:t>
+              <a:t>28-05-2012</a:t>
             </a:fld>
             <a:endParaRPr lang="pt-PT"/>
           </a:p>
@@ -1980,7 +1980,7 @@
           <a:p>
             <a:fld id="{EDD44D33-DDD1-4541-B882-E9A9CC0E7DF4}" type="datetimeFigureOut">
               <a:rPr lang="pt-PT" smtClean="0"/>
-              <a:t>25-05-2012</a:t>
+              <a:t>28-05-2012</a:t>
             </a:fld>
             <a:endParaRPr lang="pt-PT"/>
           </a:p>
@@ -2257,7 +2257,7 @@
           <a:p>
             <a:fld id="{EDD44D33-DDD1-4541-B882-E9A9CC0E7DF4}" type="datetimeFigureOut">
               <a:rPr lang="pt-PT" smtClean="0"/>
-              <a:t>25-05-2012</a:t>
+              <a:t>28-05-2012</a:t>
             </a:fld>
             <a:endParaRPr lang="pt-PT"/>
           </a:p>
@@ -2510,7 +2510,7 @@
           <a:p>
             <a:fld id="{EDD44D33-DDD1-4541-B882-E9A9CC0E7DF4}" type="datetimeFigureOut">
               <a:rPr lang="pt-PT" smtClean="0"/>
-              <a:t>25-05-2012</a:t>
+              <a:t>28-05-2012</a:t>
             </a:fld>
             <a:endParaRPr lang="pt-PT"/>
           </a:p>
@@ -2723,7 +2723,7 @@
           <a:p>
             <a:fld id="{EDD44D33-DDD1-4541-B882-E9A9CC0E7DF4}" type="datetimeFigureOut">
               <a:rPr lang="pt-PT" smtClean="0"/>
-              <a:t>25-05-2012</a:t>
+              <a:t>28-05-2012</a:t>
             </a:fld>
             <a:endParaRPr lang="pt-PT"/>
           </a:p>
@@ -3267,96 +3267,92 @@
         </p:nvSpPr>
         <p:spPr>
           <a:xfrm>
-            <a:off x="902390" y="1600200"/>
+            <a:off x="914400" y="1772816"/>
             <a:ext cx="8229600" cy="5257800"/>
           </a:xfrm>
         </p:spPr>
         <p:txBody>
-          <a:bodyPr/>
+          <a:bodyPr>
+            <a:normAutofit/>
+          </a:bodyPr>
           <a:lstStyle/>
           <a:p>
             <a:r>
               <a:rPr lang="pt-PT" dirty="0" smtClean="0"/>
-              <a:t>Pedro Isidoro     nº 13778</a:t>
-            </a:r>
-          </a:p>
-          <a:p>
+              <a:t>André </a:t>
+            </a:r>
+            <a:r>
+              <a:rPr lang="pt-PT" dirty="0"/>
+              <a:t>Pereira    nº 13671</a:t>
+            </a:r>
+          </a:p>
+          <a:p>
+            <a:r>
+              <a:rPr lang="pt-PT" dirty="0"/>
+              <a:t>Aurélien Mota   nº 13673</a:t>
+            </a:r>
+          </a:p>
+          <a:p>
+            <a:r>
+              <a:rPr lang="pt-PT" dirty="0"/>
+              <a:t>Ruben Félix        nº </a:t>
+            </a:r>
             <a:r>
               <a:rPr lang="pt-PT" dirty="0" smtClean="0"/>
-              <a:t>Pedro Alves        nº 15195</a:t>
-            </a:r>
-          </a:p>
-          <a:p>
-            <a:r>
-              <a:rPr lang="pt-PT" dirty="0" err="1" smtClean="0"/>
-              <a:t>Aurélien</a:t>
-            </a:r>
+              <a:t>13691</a:t>
+            </a:r>
+            <a:endParaRPr lang="pt-PT" dirty="0" smtClean="0"/>
+          </a:p>
+          <a:p>
             <a:r>
               <a:rPr lang="pt-PT" dirty="0" smtClean="0"/>
-              <a:t> Mota   nº 13</a:t>
-            </a:r>
-          </a:p>
-          <a:p>
+              <a:t>Pedro </a:t>
+            </a:r>
             <a:r>
               <a:rPr lang="pt-PT" dirty="0" smtClean="0"/>
-              <a:t>Ruben </a:t>
-            </a:r>
-            <a:r>
-              <a:rPr lang="pt-PT" dirty="0" err="1" smtClean="0"/>
-              <a:t>Felix</a:t>
+              <a:t>Isidoro     nº </a:t>
             </a:r>
             <a:r>
               <a:rPr lang="pt-PT" dirty="0" smtClean="0"/>
-              <a:t>        nº </a:t>
-            </a:r>
-          </a:p>
-          <a:p>
+              <a:t>13778</a:t>
+            </a:r>
+          </a:p>
+          <a:p>
+            <a:r>
+              <a:rPr lang="pt-PT" dirty="0"/>
+              <a:t>André Simões    nº </a:t>
+            </a:r>
             <a:r>
               <a:rPr lang="pt-PT" dirty="0" smtClean="0"/>
-              <a:t>Hélio Miranda   </a:t>
-            </a:r>
-            <a:r>
-              <a:rPr lang="pt-PT" smtClean="0"/>
-              <a:t>nº 13</a:t>
+              <a:t>13874</a:t>
             </a:r>
             <a:endParaRPr lang="pt-PT" dirty="0" smtClean="0"/>
           </a:p>
           <a:p>
             <a:r>
               <a:rPr lang="pt-PT" dirty="0" smtClean="0"/>
-              <a:t>André Pereira    </a:t>
+              <a:t>Hélio </a:t>
             </a:r>
             <a:r>
               <a:rPr lang="pt-PT" dirty="0" smtClean="0"/>
-              <a:t>nº 13</a:t>
+              <a:t>Miranda   nº </a:t>
+            </a:r>
+            <a:r>
+              <a:rPr lang="pt-PT" dirty="0"/>
+              <a:t>13883</a:t>
             </a:r>
             <a:endParaRPr lang="pt-PT" dirty="0" smtClean="0"/>
           </a:p>
           <a:p>
             <a:r>
+              <a:rPr lang="pt-PT" dirty="0"/>
+              <a:t>Pedro Alves        nº </a:t>
+            </a:r>
+            <a:r>
               <a:rPr lang="pt-PT" dirty="0" smtClean="0"/>
-              <a:t>André Simões    </a:t>
-            </a:r>
-            <a:r>
-              <a:rPr lang="pt-PT" dirty="0" smtClean="0"/>
-              <a:t>nº 13874</a:t>
+              <a:t>15195</a:t>
             </a:r>
             <a:endParaRPr lang="pt-PT" dirty="0" smtClean="0"/>
-          </a:p>
-          <a:p>
-            <a:r>
-              <a:rPr lang="pt-PT" dirty="0" smtClean="0">
-                <a:solidFill>
-                  <a:srgbClr val="FF0000"/>
-                </a:solidFill>
-              </a:rPr>
-              <a:t>(depois ordenar pelo nº)</a:t>
-            </a:r>
-            <a:endParaRPr lang="pt-PT" dirty="0">
-              <a:solidFill>
-                <a:srgbClr val="FF0000"/>
-              </a:solidFill>
-            </a:endParaRPr>
           </a:p>
         </p:txBody>
       </p:sp>

</xml_diff>

<commit_message>
Alteração da Apresentação/Relatório: - Descrição dos testes efectuados
Ass: Pedro Isidoro, Aurélien Mota e Fábio Salvador.
</commit_message>
<xml_diff>
--- a/ApresentacaoRelatorio_PSI_GeneticLAB.pptx
+++ b/ApresentacaoRelatorio_PSI_GeneticLAB.pptx
@@ -9,6 +9,22 @@
     <p:sldId id="257" r:id="rId3"/>
     <p:sldId id="258" r:id="rId4"/>
     <p:sldId id="259" r:id="rId5"/>
+    <p:sldId id="260" r:id="rId6"/>
+    <p:sldId id="261" r:id="rId7"/>
+    <p:sldId id="262" r:id="rId8"/>
+    <p:sldId id="263" r:id="rId9"/>
+    <p:sldId id="264" r:id="rId10"/>
+    <p:sldId id="265" r:id="rId11"/>
+    <p:sldId id="266" r:id="rId12"/>
+    <p:sldId id="267" r:id="rId13"/>
+    <p:sldId id="268" r:id="rId14"/>
+    <p:sldId id="269" r:id="rId15"/>
+    <p:sldId id="270" r:id="rId16"/>
+    <p:sldId id="271" r:id="rId17"/>
+    <p:sldId id="272" r:id="rId18"/>
+    <p:sldId id="273" r:id="rId19"/>
+    <p:sldId id="274" r:id="rId20"/>
+    <p:sldId id="275" r:id="rId21"/>
   </p:sldIdLst>
   <p:sldSz cx="9144000" cy="6858000" type="screen4x3"/>
   <p:notesSz cx="6858000" cy="9144000"/>
@@ -291,7 +307,7 @@
           <a:p>
             <a:fld id="{EDD44D33-DDD1-4541-B882-E9A9CC0E7DF4}" type="datetimeFigureOut">
               <a:rPr lang="pt-PT" smtClean="0"/>
-              <a:t>28-05-2012</a:t>
+              <a:t>04-06-2012</a:t>
             </a:fld>
             <a:endParaRPr lang="pt-PT"/>
           </a:p>
@@ -461,7 +477,7 @@
           <a:p>
             <a:fld id="{EDD44D33-DDD1-4541-B882-E9A9CC0E7DF4}" type="datetimeFigureOut">
               <a:rPr lang="pt-PT" smtClean="0"/>
-              <a:t>28-05-2012</a:t>
+              <a:t>04-06-2012</a:t>
             </a:fld>
             <a:endParaRPr lang="pt-PT"/>
           </a:p>
@@ -641,7 +657,7 @@
           <a:p>
             <a:fld id="{EDD44D33-DDD1-4541-B882-E9A9CC0E7DF4}" type="datetimeFigureOut">
               <a:rPr lang="pt-PT" smtClean="0"/>
-              <a:t>28-05-2012</a:t>
+              <a:t>04-06-2012</a:t>
             </a:fld>
             <a:endParaRPr lang="pt-PT"/>
           </a:p>
@@ -811,7 +827,7 @@
           <a:p>
             <a:fld id="{EDD44D33-DDD1-4541-B882-E9A9CC0E7DF4}" type="datetimeFigureOut">
               <a:rPr lang="pt-PT" smtClean="0"/>
-              <a:t>28-05-2012</a:t>
+              <a:t>04-06-2012</a:t>
             </a:fld>
             <a:endParaRPr lang="pt-PT"/>
           </a:p>
@@ -1057,7 +1073,7 @@
           <a:p>
             <a:fld id="{EDD44D33-DDD1-4541-B882-E9A9CC0E7DF4}" type="datetimeFigureOut">
               <a:rPr lang="pt-PT" smtClean="0"/>
-              <a:t>28-05-2012</a:t>
+              <a:t>04-06-2012</a:t>
             </a:fld>
             <a:endParaRPr lang="pt-PT"/>
           </a:p>
@@ -1345,7 +1361,7 @@
           <a:p>
             <a:fld id="{EDD44D33-DDD1-4541-B882-E9A9CC0E7DF4}" type="datetimeFigureOut">
               <a:rPr lang="pt-PT" smtClean="0"/>
-              <a:t>28-05-2012</a:t>
+              <a:t>04-06-2012</a:t>
             </a:fld>
             <a:endParaRPr lang="pt-PT"/>
           </a:p>
@@ -1767,7 +1783,7 @@
           <a:p>
             <a:fld id="{EDD44D33-DDD1-4541-B882-E9A9CC0E7DF4}" type="datetimeFigureOut">
               <a:rPr lang="pt-PT" smtClean="0"/>
-              <a:t>28-05-2012</a:t>
+              <a:t>04-06-2012</a:t>
             </a:fld>
             <a:endParaRPr lang="pt-PT"/>
           </a:p>
@@ -1885,7 +1901,7 @@
           <a:p>
             <a:fld id="{EDD44D33-DDD1-4541-B882-E9A9CC0E7DF4}" type="datetimeFigureOut">
               <a:rPr lang="pt-PT" smtClean="0"/>
-              <a:t>28-05-2012</a:t>
+              <a:t>04-06-2012</a:t>
             </a:fld>
             <a:endParaRPr lang="pt-PT"/>
           </a:p>
@@ -1980,7 +1996,7 @@
           <a:p>
             <a:fld id="{EDD44D33-DDD1-4541-B882-E9A9CC0E7DF4}" type="datetimeFigureOut">
               <a:rPr lang="pt-PT" smtClean="0"/>
-              <a:t>28-05-2012</a:t>
+              <a:t>04-06-2012</a:t>
             </a:fld>
             <a:endParaRPr lang="pt-PT"/>
           </a:p>
@@ -2257,7 +2273,7 @@
           <a:p>
             <a:fld id="{EDD44D33-DDD1-4541-B882-E9A9CC0E7DF4}" type="datetimeFigureOut">
               <a:rPr lang="pt-PT" smtClean="0"/>
-              <a:t>28-05-2012</a:t>
+              <a:t>04-06-2012</a:t>
             </a:fld>
             <a:endParaRPr lang="pt-PT"/>
           </a:p>
@@ -2510,7 +2526,7 @@
           <a:p>
             <a:fld id="{EDD44D33-DDD1-4541-B882-E9A9CC0E7DF4}" type="datetimeFigureOut">
               <a:rPr lang="pt-PT" smtClean="0"/>
-              <a:t>28-05-2012</a:t>
+              <a:t>04-06-2012</a:t>
             </a:fld>
             <a:endParaRPr lang="pt-PT"/>
           </a:p>
@@ -2723,7 +2739,7 @@
           <a:p>
             <a:fld id="{EDD44D33-DDD1-4541-B882-E9A9CC0E7DF4}" type="datetimeFigureOut">
               <a:rPr lang="pt-PT" smtClean="0"/>
-              <a:t>28-05-2012</a:t>
+              <a:t>04-06-2012</a:t>
             </a:fld>
             <a:endParaRPr lang="pt-PT"/>
           </a:p>
@@ -3215,6 +3231,1347 @@
 </p:sld>
 </file>
 
+<file path=ppt/slides/slide10.xml><?xml version="1.0" encoding="utf-8"?>
+<p:sld xmlns:a="http://schemas.openxmlformats.org/drawingml/2006/main" xmlns:r="http://schemas.openxmlformats.org/officeDocument/2006/relationships" xmlns:p="http://schemas.openxmlformats.org/presentationml/2006/main">
+  <p:cSld>
+    <p:spTree>
+      <p:nvGrpSpPr>
+        <p:cNvPr id="1" name=""/>
+        <p:cNvGrpSpPr/>
+        <p:nvPr/>
+      </p:nvGrpSpPr>
+      <p:grpSpPr>
+        <a:xfrm>
+          <a:off x="0" y="0"/>
+          <a:ext cx="0" cy="0"/>
+          <a:chOff x="0" y="0"/>
+          <a:chExt cx="0" cy="0"/>
+        </a:xfrm>
+      </p:grpSpPr>
+      <p:sp>
+        <p:nvSpPr>
+          <p:cNvPr id="2" name="Título 1"/>
+          <p:cNvSpPr>
+            <a:spLocks noGrp="1"/>
+          </p:cNvSpPr>
+          <p:nvPr>
+            <p:ph type="title"/>
+          </p:nvPr>
+        </p:nvSpPr>
+        <p:spPr/>
+        <p:txBody>
+          <a:bodyPr/>
+          <a:lstStyle/>
+          <a:p>
+            <a:r>
+              <a:rPr lang="pt-PT" dirty="0" err="1" smtClean="0"/>
+              <a:t>Crossover</a:t>
+            </a:r>
+            <a:endParaRPr lang="pt-PT" dirty="0"/>
+          </a:p>
+        </p:txBody>
+      </p:sp>
+      <p:sp>
+        <p:nvSpPr>
+          <p:cNvPr id="3" name="Marcador de Posição de Conteúdo 2"/>
+          <p:cNvSpPr>
+            <a:spLocks noGrp="1"/>
+          </p:cNvSpPr>
+          <p:nvPr>
+            <p:ph idx="1"/>
+          </p:nvPr>
+        </p:nvSpPr>
+        <p:spPr/>
+        <p:txBody>
+          <a:bodyPr/>
+          <a:lstStyle/>
+          <a:p>
+            <a:endParaRPr lang="pt-PT" dirty="0"/>
+          </a:p>
+        </p:txBody>
+      </p:sp>
+    </p:spTree>
+    <p:extLst>
+      <p:ext uri="{BB962C8B-B14F-4D97-AF65-F5344CB8AC3E}">
+        <p14:creationId xmlns:p14="http://schemas.microsoft.com/office/powerpoint/2010/main" val="4019661992"/>
+      </p:ext>
+    </p:extLst>
+  </p:cSld>
+  <p:clrMapOvr>
+    <a:masterClrMapping/>
+  </p:clrMapOvr>
+</p:sld>
+</file>
+
+<file path=ppt/slides/slide11.xml><?xml version="1.0" encoding="utf-8"?>
+<p:sld xmlns:a="http://schemas.openxmlformats.org/drawingml/2006/main" xmlns:r="http://schemas.openxmlformats.org/officeDocument/2006/relationships" xmlns:p="http://schemas.openxmlformats.org/presentationml/2006/main">
+  <p:cSld>
+    <p:spTree>
+      <p:nvGrpSpPr>
+        <p:cNvPr id="1" name=""/>
+        <p:cNvGrpSpPr/>
+        <p:nvPr/>
+      </p:nvGrpSpPr>
+      <p:grpSpPr>
+        <a:xfrm>
+          <a:off x="0" y="0"/>
+          <a:ext cx="0" cy="0"/>
+          <a:chOff x="0" y="0"/>
+          <a:chExt cx="0" cy="0"/>
+        </a:xfrm>
+      </p:grpSpPr>
+      <p:sp>
+        <p:nvSpPr>
+          <p:cNvPr id="2" name="Título 1"/>
+          <p:cNvSpPr>
+            <a:spLocks noGrp="1"/>
+          </p:cNvSpPr>
+          <p:nvPr>
+            <p:ph type="title"/>
+          </p:nvPr>
+        </p:nvSpPr>
+        <p:spPr/>
+        <p:txBody>
+          <a:bodyPr>
+            <a:normAutofit/>
+          </a:bodyPr>
+          <a:lstStyle/>
+          <a:p>
+            <a:r>
+              <a:rPr lang="pt-PT" dirty="0"/>
+              <a:t>Uniforme </a:t>
+            </a:r>
+            <a:r>
+              <a:rPr lang="pt-PT" dirty="0" err="1" smtClean="0"/>
+              <a:t>Crossover</a:t>
+            </a:r>
+            <a:endParaRPr lang="pt-PT" dirty="0"/>
+          </a:p>
+        </p:txBody>
+      </p:sp>
+      <p:sp>
+        <p:nvSpPr>
+          <p:cNvPr id="3" name="Marcador de Posição de Conteúdo 2"/>
+          <p:cNvSpPr>
+            <a:spLocks noGrp="1"/>
+          </p:cNvSpPr>
+          <p:nvPr>
+            <p:ph idx="1"/>
+          </p:nvPr>
+        </p:nvSpPr>
+        <p:spPr>
+          <a:xfrm>
+            <a:off x="457200" y="1600200"/>
+            <a:ext cx="8229600" cy="5257800"/>
+          </a:xfrm>
+        </p:spPr>
+        <p:txBody>
+          <a:bodyPr>
+            <a:normAutofit fontScale="85000" lnSpcReduction="10000"/>
+          </a:bodyPr>
+          <a:lstStyle/>
+          <a:p>
+            <a:pPr algn="just"/>
+            <a:r>
+              <a:rPr lang="pt-PT" dirty="0" smtClean="0"/>
+              <a:t>Verifica </a:t>
+            </a:r>
+            <a:r>
+              <a:rPr lang="pt-PT" dirty="0"/>
+              <a:t>se o número de </a:t>
+            </a:r>
+            <a:r>
+              <a:rPr lang="pt-PT" dirty="0" smtClean="0"/>
+              <a:t>zeros e uns </a:t>
+            </a:r>
+            <a:r>
+              <a:rPr lang="pt-PT" dirty="0"/>
+              <a:t>da parte dos pais é igual ao número de </a:t>
+            </a:r>
+            <a:r>
+              <a:rPr lang="pt-PT" dirty="0" smtClean="0"/>
+              <a:t>zeros e uns </a:t>
+            </a:r>
+            <a:r>
+              <a:rPr lang="pt-PT" dirty="0"/>
+              <a:t>da parte dos </a:t>
+            </a:r>
+            <a:r>
+              <a:rPr lang="pt-PT" dirty="0" smtClean="0"/>
+              <a:t>filhos</a:t>
+            </a:r>
+          </a:p>
+          <a:p>
+            <a:pPr marL="0" indent="0" algn="just">
+              <a:buNone/>
+            </a:pPr>
+            <a:endParaRPr lang="pt-PT" dirty="0" smtClean="0"/>
+          </a:p>
+          <a:p>
+            <a:pPr algn="just"/>
+            <a:r>
+              <a:rPr lang="pt-PT" dirty="0"/>
+              <a:t>Verifica se o número de uns nos pais é igual ao número de uns nos </a:t>
+            </a:r>
+            <a:r>
+              <a:rPr lang="pt-PT" dirty="0" smtClean="0"/>
+              <a:t>filhos</a:t>
+            </a:r>
+          </a:p>
+          <a:p>
+            <a:pPr marL="0" indent="0" algn="just">
+              <a:buNone/>
+            </a:pPr>
+            <a:endParaRPr lang="pt-PT" dirty="0" smtClean="0"/>
+          </a:p>
+          <a:p>
+            <a:pPr algn="just"/>
+            <a:r>
+              <a:rPr lang="pt-PT" dirty="0"/>
+              <a:t>Verifica se o número de zeros nos pais é igual ao número de zeros nos </a:t>
+            </a:r>
+            <a:r>
+              <a:rPr lang="pt-PT" dirty="0" smtClean="0"/>
+              <a:t>filhos</a:t>
+            </a:r>
+          </a:p>
+          <a:p>
+            <a:pPr marL="0" indent="0" algn="just">
+              <a:buNone/>
+            </a:pPr>
+            <a:endParaRPr lang="pt-PT" dirty="0" smtClean="0"/>
+          </a:p>
+          <a:p>
+            <a:pPr algn="just"/>
+            <a:r>
+              <a:rPr lang="pt-PT" dirty="0" smtClean="0"/>
+              <a:t>Verifica </a:t>
+            </a:r>
+            <a:r>
+              <a:rPr lang="pt-PT" dirty="0"/>
+              <a:t>se a população recebida tem o mesmo número de </a:t>
+            </a:r>
+            <a:r>
+              <a:rPr lang="pt-PT" dirty="0" smtClean="0"/>
+              <a:t>indivíduos </a:t>
+            </a:r>
+            <a:r>
+              <a:rPr lang="pt-PT" dirty="0"/>
+              <a:t>que a população que entrou </a:t>
+            </a:r>
+            <a:endParaRPr lang="pt-PT" dirty="0" smtClean="0"/>
+          </a:p>
+        </p:txBody>
+      </p:sp>
+    </p:spTree>
+    <p:extLst>
+      <p:ext uri="{BB962C8B-B14F-4D97-AF65-F5344CB8AC3E}">
+        <p14:creationId xmlns:p14="http://schemas.microsoft.com/office/powerpoint/2010/main" val="3411796542"/>
+      </p:ext>
+    </p:extLst>
+  </p:cSld>
+  <p:clrMapOvr>
+    <a:masterClrMapping/>
+  </p:clrMapOvr>
+</p:sld>
+</file>
+
+<file path=ppt/slides/slide12.xml><?xml version="1.0" encoding="utf-8"?>
+<p:sld xmlns:a="http://schemas.openxmlformats.org/drawingml/2006/main" xmlns:r="http://schemas.openxmlformats.org/officeDocument/2006/relationships" xmlns:p="http://schemas.openxmlformats.org/presentationml/2006/main">
+  <p:cSld>
+    <p:spTree>
+      <p:nvGrpSpPr>
+        <p:cNvPr id="1" name=""/>
+        <p:cNvGrpSpPr/>
+        <p:nvPr/>
+      </p:nvGrpSpPr>
+      <p:grpSpPr>
+        <a:xfrm>
+          <a:off x="0" y="0"/>
+          <a:ext cx="0" cy="0"/>
+          <a:chOff x="0" y="0"/>
+          <a:chExt cx="0" cy="0"/>
+        </a:xfrm>
+      </p:grpSpPr>
+      <p:sp>
+        <p:nvSpPr>
+          <p:cNvPr id="2" name="Título 1"/>
+          <p:cNvSpPr>
+            <a:spLocks noGrp="1"/>
+          </p:cNvSpPr>
+          <p:nvPr>
+            <p:ph type="title"/>
+          </p:nvPr>
+        </p:nvSpPr>
+        <p:spPr/>
+        <p:txBody>
+          <a:bodyPr/>
+          <a:lstStyle/>
+          <a:p>
+            <a:r>
+              <a:rPr lang="pt-PT" dirty="0"/>
+              <a:t>Uniforme </a:t>
+            </a:r>
+            <a:r>
+              <a:rPr lang="pt-PT" dirty="0" err="1"/>
+              <a:t>Crossover</a:t>
+            </a:r>
+            <a:endParaRPr lang="pt-PT" dirty="0"/>
+          </a:p>
+        </p:txBody>
+      </p:sp>
+      <p:sp>
+        <p:nvSpPr>
+          <p:cNvPr id="3" name="Marcador de Posição de Conteúdo 2"/>
+          <p:cNvSpPr>
+            <a:spLocks noGrp="1"/>
+          </p:cNvSpPr>
+          <p:nvPr>
+            <p:ph idx="1"/>
+          </p:nvPr>
+        </p:nvSpPr>
+        <p:spPr>
+          <a:xfrm>
+            <a:off x="457200" y="1600200"/>
+            <a:ext cx="8579296" cy="5257800"/>
+          </a:xfrm>
+        </p:spPr>
+        <p:txBody>
+          <a:bodyPr>
+            <a:normAutofit lnSpcReduction="10000"/>
+          </a:bodyPr>
+          <a:lstStyle/>
+          <a:p>
+            <a:pPr algn="just"/>
+            <a:r>
+              <a:rPr lang="pt-PT" dirty="0"/>
+              <a:t>Verifica se a população inicial é impar para fazer um teste adicional</a:t>
+            </a:r>
+          </a:p>
+          <a:p>
+            <a:pPr lvl="1" algn="just"/>
+            <a:r>
+              <a:rPr lang="pt-PT" dirty="0"/>
+              <a:t>Se for impar, ordenando a população saberemos que o ultimo elemento dessa população estará obrigatoriamente presente na população filho já que o ultimo elemento não teve ninguém para troca de informação genética, o que quer dizer que foi adicionado sem alterações à população </a:t>
+            </a:r>
+            <a:r>
+              <a:rPr lang="pt-PT" dirty="0" smtClean="0"/>
+              <a:t>filho</a:t>
+            </a:r>
+          </a:p>
+          <a:p>
+            <a:pPr lvl="1" algn="just"/>
+            <a:endParaRPr lang="pt-PT" dirty="0"/>
+          </a:p>
+          <a:p>
+            <a:pPr algn="just"/>
+            <a:r>
+              <a:rPr lang="pt-PT" dirty="0"/>
+              <a:t>Verifica se as medidas estatísticas da população filho e pai são diferentes</a:t>
+            </a:r>
+          </a:p>
+          <a:p>
+            <a:endParaRPr lang="pt-PT" dirty="0"/>
+          </a:p>
+        </p:txBody>
+      </p:sp>
+    </p:spTree>
+    <p:extLst>
+      <p:ext uri="{BB962C8B-B14F-4D97-AF65-F5344CB8AC3E}">
+        <p14:creationId xmlns:p14="http://schemas.microsoft.com/office/powerpoint/2010/main" val="1151608276"/>
+      </p:ext>
+    </p:extLst>
+  </p:cSld>
+  <p:clrMapOvr>
+    <a:masterClrMapping/>
+  </p:clrMapOvr>
+</p:sld>
+</file>
+
+<file path=ppt/slides/slide13.xml><?xml version="1.0" encoding="utf-8"?>
+<p:sld xmlns:a="http://schemas.openxmlformats.org/drawingml/2006/main" xmlns:r="http://schemas.openxmlformats.org/officeDocument/2006/relationships" xmlns:p="http://schemas.openxmlformats.org/presentationml/2006/main">
+  <p:cSld>
+    <p:spTree>
+      <p:nvGrpSpPr>
+        <p:cNvPr id="1" name=""/>
+        <p:cNvGrpSpPr/>
+        <p:nvPr/>
+      </p:nvGrpSpPr>
+      <p:grpSpPr>
+        <a:xfrm>
+          <a:off x="0" y="0"/>
+          <a:ext cx="0" cy="0"/>
+          <a:chOff x="0" y="0"/>
+          <a:chExt cx="0" cy="0"/>
+        </a:xfrm>
+      </p:grpSpPr>
+      <p:sp>
+        <p:nvSpPr>
+          <p:cNvPr id="2" name="Título 1"/>
+          <p:cNvSpPr>
+            <a:spLocks noGrp="1"/>
+          </p:cNvSpPr>
+          <p:nvPr>
+            <p:ph type="title"/>
+          </p:nvPr>
+        </p:nvSpPr>
+        <p:spPr/>
+        <p:txBody>
+          <a:bodyPr/>
+          <a:lstStyle/>
+          <a:p>
+            <a:r>
+              <a:rPr lang="pt-PT" dirty="0" smtClean="0"/>
+              <a:t>PMX</a:t>
+            </a:r>
+            <a:endParaRPr lang="pt-PT" dirty="0"/>
+          </a:p>
+        </p:txBody>
+      </p:sp>
+      <p:sp>
+        <p:nvSpPr>
+          <p:cNvPr id="3" name="Marcador de Posição de Conteúdo 2"/>
+          <p:cNvSpPr>
+            <a:spLocks noGrp="1"/>
+          </p:cNvSpPr>
+          <p:nvPr>
+            <p:ph idx="1"/>
+          </p:nvPr>
+        </p:nvSpPr>
+        <p:spPr/>
+        <p:txBody>
+          <a:bodyPr/>
+          <a:lstStyle/>
+          <a:p>
+            <a:r>
+              <a:rPr lang="pt-PT" dirty="0"/>
+              <a:t>Ver se todos os números são diferentes em cada </a:t>
+            </a:r>
+            <a:r>
+              <a:rPr lang="pt-PT" dirty="0" smtClean="0"/>
+              <a:t>individuo</a:t>
+            </a:r>
+          </a:p>
+          <a:p>
+            <a:endParaRPr lang="pt-PT" dirty="0" smtClean="0"/>
+          </a:p>
+          <a:p>
+            <a:r>
+              <a:rPr lang="pt-PT" dirty="0" smtClean="0"/>
+              <a:t>Testar se o número de pais é igual ao número de filhos</a:t>
+            </a:r>
+          </a:p>
+          <a:p>
+            <a:endParaRPr lang="pt-PT" dirty="0"/>
+          </a:p>
+        </p:txBody>
+      </p:sp>
+    </p:spTree>
+    <p:extLst>
+      <p:ext uri="{BB962C8B-B14F-4D97-AF65-F5344CB8AC3E}">
+        <p14:creationId xmlns:p14="http://schemas.microsoft.com/office/powerpoint/2010/main" val="3416185641"/>
+      </p:ext>
+    </p:extLst>
+  </p:cSld>
+  <p:clrMapOvr>
+    <a:masterClrMapping/>
+  </p:clrMapOvr>
+</p:sld>
+</file>
+
+<file path=ppt/slides/slide14.xml><?xml version="1.0" encoding="utf-8"?>
+<p:sld xmlns:a="http://schemas.openxmlformats.org/drawingml/2006/main" xmlns:r="http://schemas.openxmlformats.org/officeDocument/2006/relationships" xmlns:p="http://schemas.openxmlformats.org/presentationml/2006/main">
+  <p:cSld>
+    <p:spTree>
+      <p:nvGrpSpPr>
+        <p:cNvPr id="1" name=""/>
+        <p:cNvGrpSpPr/>
+        <p:nvPr/>
+      </p:nvGrpSpPr>
+      <p:grpSpPr>
+        <a:xfrm>
+          <a:off x="0" y="0"/>
+          <a:ext cx="0" cy="0"/>
+          <a:chOff x="0" y="0"/>
+          <a:chExt cx="0" cy="0"/>
+        </a:xfrm>
+      </p:grpSpPr>
+      <p:sp>
+        <p:nvSpPr>
+          <p:cNvPr id="2" name="Título 1"/>
+          <p:cNvSpPr>
+            <a:spLocks noGrp="1"/>
+          </p:cNvSpPr>
+          <p:nvPr>
+            <p:ph type="title"/>
+          </p:nvPr>
+        </p:nvSpPr>
+        <p:spPr/>
+        <p:txBody>
+          <a:bodyPr/>
+          <a:lstStyle/>
+          <a:p>
+            <a:r>
+              <a:rPr lang="pt-PT" dirty="0" smtClean="0"/>
+              <a:t>Operadores de Mutação</a:t>
+            </a:r>
+            <a:endParaRPr lang="pt-PT" dirty="0"/>
+          </a:p>
+        </p:txBody>
+      </p:sp>
+      <p:sp>
+        <p:nvSpPr>
+          <p:cNvPr id="3" name="Marcador de Posição de Conteúdo 2"/>
+          <p:cNvSpPr>
+            <a:spLocks noGrp="1"/>
+          </p:cNvSpPr>
+          <p:nvPr>
+            <p:ph idx="1"/>
+          </p:nvPr>
+        </p:nvSpPr>
+        <p:spPr/>
+        <p:txBody>
+          <a:bodyPr/>
+          <a:lstStyle/>
+          <a:p>
+            <a:r>
+              <a:rPr lang="pt-PT" dirty="0" err="1" smtClean="0"/>
+              <a:t>FlipBit</a:t>
+            </a:r>
+            <a:endParaRPr lang="pt-PT" dirty="0" smtClean="0"/>
+          </a:p>
+          <a:p>
+            <a:endParaRPr lang="pt-PT" dirty="0" smtClean="0"/>
+          </a:p>
+          <a:p>
+            <a:endParaRPr lang="pt-PT" dirty="0" smtClean="0"/>
+          </a:p>
+          <a:p>
+            <a:endParaRPr lang="pt-PT" dirty="0"/>
+          </a:p>
+          <a:p>
+            <a:r>
+              <a:rPr lang="pt-PT" dirty="0" err="1" smtClean="0"/>
+              <a:t>Invertion</a:t>
+            </a:r>
+            <a:endParaRPr lang="pt-PT" dirty="0" smtClean="0"/>
+          </a:p>
+          <a:p>
+            <a:endParaRPr lang="pt-PT" dirty="0"/>
+          </a:p>
+        </p:txBody>
+      </p:sp>
+      <p:pic>
+        <p:nvPicPr>
+          <p:cNvPr id="3074" name="Picture 2"/>
+          <p:cNvPicPr>
+            <a:picLocks noChangeAspect="1" noChangeArrowheads="1"/>
+          </p:cNvPicPr>
+          <p:nvPr/>
+        </p:nvPicPr>
+        <p:blipFill>
+          <a:blip r:embed="rId2">
+            <a:extLst>
+              <a:ext uri="{28A0092B-C50C-407E-A947-70E740481C1C}">
+                <a14:useLocalDpi xmlns:a14="http://schemas.microsoft.com/office/drawing/2010/main" val="0"/>
+              </a:ext>
+            </a:extLst>
+          </a:blip>
+          <a:srcRect/>
+          <a:stretch>
+            <a:fillRect/>
+          </a:stretch>
+        </p:blipFill>
+        <p:spPr bwMode="auto">
+          <a:xfrm>
+            <a:off x="3104789" y="2060848"/>
+            <a:ext cx="4945827" cy="1255191"/>
+          </a:xfrm>
+          <a:prstGeom prst="rect">
+            <a:avLst/>
+          </a:prstGeom>
+          <a:noFill/>
+          <a:ln>
+            <a:noFill/>
+          </a:ln>
+          <a:effectLst/>
+          <a:extLst>
+            <a:ext uri="{909E8E84-426E-40DD-AFC4-6F175D3DCCD1}">
+              <a14:hiddenFill xmlns:a14="http://schemas.microsoft.com/office/drawing/2010/main">
+                <a:solidFill>
+                  <a:schemeClr val="accent1"/>
+                </a:solidFill>
+              </a14:hiddenFill>
+            </a:ext>
+            <a:ext uri="{91240B29-F687-4F45-9708-019B960494DF}">
+              <a14:hiddenLine xmlns:a14="http://schemas.microsoft.com/office/drawing/2010/main" w="9525">
+                <a:solidFill>
+                  <a:schemeClr val="tx1"/>
+                </a:solidFill>
+                <a:miter lim="800000"/>
+                <a:headEnd/>
+                <a:tailEnd/>
+              </a14:hiddenLine>
+            </a:ext>
+            <a:ext uri="{AF507438-7753-43E0-B8FC-AC1667EBCBE1}">
+              <a14:hiddenEffects xmlns:a14="http://schemas.microsoft.com/office/drawing/2010/main">
+                <a:effectLst>
+                  <a:outerShdw dist="35921" dir="2700000" algn="ctr" rotWithShape="0">
+                    <a:schemeClr val="bg2"/>
+                  </a:outerShdw>
+                </a:effectLst>
+              </a14:hiddenEffects>
+            </a:ext>
+          </a:extLst>
+        </p:spPr>
+      </p:pic>
+      <p:pic>
+        <p:nvPicPr>
+          <p:cNvPr id="3075" name="Picture 3"/>
+          <p:cNvPicPr>
+            <a:picLocks noChangeAspect="1" noChangeArrowheads="1"/>
+          </p:cNvPicPr>
+          <p:nvPr/>
+        </p:nvPicPr>
+        <p:blipFill>
+          <a:blip r:embed="rId3">
+            <a:extLst>
+              <a:ext uri="{28A0092B-C50C-407E-A947-70E740481C1C}">
+                <a14:useLocalDpi xmlns:a14="http://schemas.microsoft.com/office/drawing/2010/main" val="0"/>
+              </a:ext>
+            </a:extLst>
+          </a:blip>
+          <a:srcRect/>
+          <a:stretch>
+            <a:fillRect/>
+          </a:stretch>
+        </p:blipFill>
+        <p:spPr bwMode="auto">
+          <a:xfrm>
+            <a:off x="3131840" y="4775151"/>
+            <a:ext cx="4674541" cy="1182068"/>
+          </a:xfrm>
+          <a:prstGeom prst="rect">
+            <a:avLst/>
+          </a:prstGeom>
+          <a:noFill/>
+          <a:ln>
+            <a:noFill/>
+          </a:ln>
+          <a:effectLst/>
+          <a:extLst>
+            <a:ext uri="{909E8E84-426E-40DD-AFC4-6F175D3DCCD1}">
+              <a14:hiddenFill xmlns:a14="http://schemas.microsoft.com/office/drawing/2010/main">
+                <a:solidFill>
+                  <a:schemeClr val="accent1"/>
+                </a:solidFill>
+              </a14:hiddenFill>
+            </a:ext>
+            <a:ext uri="{91240B29-F687-4F45-9708-019B960494DF}">
+              <a14:hiddenLine xmlns:a14="http://schemas.microsoft.com/office/drawing/2010/main" w="9525">
+                <a:solidFill>
+                  <a:schemeClr val="tx1"/>
+                </a:solidFill>
+                <a:miter lim="800000"/>
+                <a:headEnd/>
+                <a:tailEnd/>
+              </a14:hiddenLine>
+            </a:ext>
+            <a:ext uri="{AF507438-7753-43E0-B8FC-AC1667EBCBE1}">
+              <a14:hiddenEffects xmlns:a14="http://schemas.microsoft.com/office/drawing/2010/main">
+                <a:effectLst>
+                  <a:outerShdw dist="35921" dir="2700000" algn="ctr" rotWithShape="0">
+                    <a:schemeClr val="bg2"/>
+                  </a:outerShdw>
+                </a:effectLst>
+              </a14:hiddenEffects>
+            </a:ext>
+          </a:extLst>
+        </p:spPr>
+      </p:pic>
+    </p:spTree>
+    <p:extLst>
+      <p:ext uri="{BB962C8B-B14F-4D97-AF65-F5344CB8AC3E}">
+        <p14:creationId xmlns:p14="http://schemas.microsoft.com/office/powerpoint/2010/main" val="1930858895"/>
+      </p:ext>
+    </p:extLst>
+  </p:cSld>
+  <p:clrMapOvr>
+    <a:masterClrMapping/>
+  </p:clrMapOvr>
+</p:sld>
+</file>
+
+<file path=ppt/slides/slide15.xml><?xml version="1.0" encoding="utf-8"?>
+<p:sld xmlns:a="http://schemas.openxmlformats.org/drawingml/2006/main" xmlns:r="http://schemas.openxmlformats.org/officeDocument/2006/relationships" xmlns:p="http://schemas.openxmlformats.org/presentationml/2006/main">
+  <p:cSld>
+    <p:spTree>
+      <p:nvGrpSpPr>
+        <p:cNvPr id="1" name=""/>
+        <p:cNvGrpSpPr/>
+        <p:nvPr/>
+      </p:nvGrpSpPr>
+      <p:grpSpPr>
+        <a:xfrm>
+          <a:off x="0" y="0"/>
+          <a:ext cx="0" cy="0"/>
+          <a:chOff x="0" y="0"/>
+          <a:chExt cx="0" cy="0"/>
+        </a:xfrm>
+      </p:grpSpPr>
+      <p:sp>
+        <p:nvSpPr>
+          <p:cNvPr id="2" name="Título 1"/>
+          <p:cNvSpPr>
+            <a:spLocks noGrp="1"/>
+          </p:cNvSpPr>
+          <p:nvPr>
+            <p:ph type="title"/>
+          </p:nvPr>
+        </p:nvSpPr>
+        <p:spPr/>
+        <p:txBody>
+          <a:bodyPr/>
+          <a:lstStyle/>
+          <a:p>
+            <a:r>
+              <a:rPr lang="pt-PT" dirty="0" err="1"/>
+              <a:t>FlipBit</a:t>
+            </a:r>
+            <a:endParaRPr lang="pt-PT" dirty="0"/>
+          </a:p>
+        </p:txBody>
+      </p:sp>
+      <p:sp>
+        <p:nvSpPr>
+          <p:cNvPr id="3" name="Marcador de Posição de Conteúdo 2"/>
+          <p:cNvSpPr>
+            <a:spLocks noGrp="1"/>
+          </p:cNvSpPr>
+          <p:nvPr>
+            <p:ph idx="1"/>
+          </p:nvPr>
+        </p:nvSpPr>
+        <p:spPr>
+          <a:xfrm>
+            <a:off x="457200" y="1600200"/>
+            <a:ext cx="8507288" cy="5141168"/>
+          </a:xfrm>
+        </p:spPr>
+        <p:txBody>
+          <a:bodyPr>
+            <a:normAutofit/>
+          </a:bodyPr>
+          <a:lstStyle/>
+          <a:p>
+            <a:pPr algn="just"/>
+            <a:r>
+              <a:rPr lang="pt-PT" dirty="0"/>
+              <a:t>Testar se existe alteração dos bits dos </a:t>
+            </a:r>
+            <a:r>
+              <a:rPr lang="pt-PT" dirty="0" smtClean="0"/>
+              <a:t>indivíduos</a:t>
+            </a:r>
+          </a:p>
+          <a:p>
+            <a:pPr lvl="1" algn="just"/>
+            <a:endParaRPr lang="pt-PT" dirty="0" smtClean="0"/>
+          </a:p>
+          <a:p>
+            <a:pPr lvl="1" algn="just"/>
+            <a:r>
+              <a:rPr lang="pt-PT" dirty="0" smtClean="0"/>
+              <a:t>ver </a:t>
+            </a:r>
+            <a:r>
+              <a:rPr lang="pt-PT" dirty="0"/>
+              <a:t>se as populações são diferentes, uma vez que foram mutadas com probabilidade a 100</a:t>
+            </a:r>
+            <a:r>
+              <a:rPr lang="pt-PT" dirty="0" smtClean="0"/>
+              <a:t>%</a:t>
+            </a:r>
+          </a:p>
+          <a:p>
+            <a:pPr lvl="1" algn="just"/>
+            <a:endParaRPr lang="pt-PT" dirty="0" smtClean="0"/>
+          </a:p>
+          <a:p>
+            <a:pPr lvl="1" algn="just"/>
+            <a:r>
+              <a:rPr lang="pt-PT" dirty="0" smtClean="0"/>
+              <a:t>ver </a:t>
+            </a:r>
+            <a:r>
+              <a:rPr lang="pt-PT" dirty="0"/>
+              <a:t>se as populações são iguais, uma vez que foram mutadas com probabilidade a 0</a:t>
+            </a:r>
+            <a:r>
+              <a:rPr lang="pt-PT" dirty="0" smtClean="0"/>
+              <a:t>%</a:t>
+            </a:r>
+          </a:p>
+          <a:p>
+            <a:pPr marL="0" indent="0" algn="just">
+              <a:buNone/>
+            </a:pPr>
+            <a:endParaRPr lang="pt-PT" dirty="0"/>
+          </a:p>
+          <a:p>
+            <a:pPr algn="just"/>
+            <a:r>
+              <a:rPr lang="pt-PT" dirty="0"/>
+              <a:t>Testa se a população de entrada tem o mesmo tamanho da população de saída</a:t>
+            </a:r>
+          </a:p>
+        </p:txBody>
+      </p:sp>
+    </p:spTree>
+    <p:extLst>
+      <p:ext uri="{BB962C8B-B14F-4D97-AF65-F5344CB8AC3E}">
+        <p14:creationId xmlns:p14="http://schemas.microsoft.com/office/powerpoint/2010/main" val="1517299600"/>
+      </p:ext>
+    </p:extLst>
+  </p:cSld>
+  <p:clrMapOvr>
+    <a:masterClrMapping/>
+  </p:clrMapOvr>
+</p:sld>
+</file>
+
+<file path=ppt/slides/slide16.xml><?xml version="1.0" encoding="utf-8"?>
+<p:sld xmlns:a="http://schemas.openxmlformats.org/drawingml/2006/main" xmlns:r="http://schemas.openxmlformats.org/officeDocument/2006/relationships" xmlns:p="http://schemas.openxmlformats.org/presentationml/2006/main">
+  <p:cSld>
+    <p:spTree>
+      <p:nvGrpSpPr>
+        <p:cNvPr id="1" name=""/>
+        <p:cNvGrpSpPr/>
+        <p:nvPr/>
+      </p:nvGrpSpPr>
+      <p:grpSpPr>
+        <a:xfrm>
+          <a:off x="0" y="0"/>
+          <a:ext cx="0" cy="0"/>
+          <a:chOff x="0" y="0"/>
+          <a:chExt cx="0" cy="0"/>
+        </a:xfrm>
+      </p:grpSpPr>
+      <p:sp>
+        <p:nvSpPr>
+          <p:cNvPr id="2" name="Título 1"/>
+          <p:cNvSpPr>
+            <a:spLocks noGrp="1"/>
+          </p:cNvSpPr>
+          <p:nvPr>
+            <p:ph type="title"/>
+          </p:nvPr>
+        </p:nvSpPr>
+        <p:spPr/>
+        <p:txBody>
+          <a:bodyPr/>
+          <a:lstStyle/>
+          <a:p>
+            <a:r>
+              <a:rPr lang="pt-PT" dirty="0" err="1"/>
+              <a:t>Invertion</a:t>
+            </a:r>
+            <a:endParaRPr lang="pt-PT" dirty="0"/>
+          </a:p>
+        </p:txBody>
+      </p:sp>
+      <p:sp>
+        <p:nvSpPr>
+          <p:cNvPr id="3" name="Marcador de Posição de Conteúdo 2"/>
+          <p:cNvSpPr>
+            <a:spLocks noGrp="1"/>
+          </p:cNvSpPr>
+          <p:nvPr>
+            <p:ph idx="1"/>
+          </p:nvPr>
+        </p:nvSpPr>
+        <p:spPr/>
+        <p:txBody>
+          <a:bodyPr/>
+          <a:lstStyle/>
+          <a:p>
+            <a:r>
+              <a:rPr lang="pt-PT" dirty="0"/>
+              <a:t>Ver se todos os números são diferentes em cada </a:t>
+            </a:r>
+            <a:r>
+              <a:rPr lang="pt-PT" dirty="0" smtClean="0"/>
+              <a:t>individuo</a:t>
+            </a:r>
+          </a:p>
+          <a:p>
+            <a:endParaRPr lang="pt-PT" dirty="0"/>
+          </a:p>
+          <a:p>
+            <a:r>
+              <a:rPr lang="pt-PT" dirty="0" smtClean="0">
+                <a:solidFill>
+                  <a:srgbClr val="FF0000"/>
+                </a:solidFill>
+              </a:rPr>
+              <a:t>(INCOMPLETO – TESTES AINDA POR FAZER)</a:t>
+            </a:r>
+            <a:endParaRPr lang="pt-PT" dirty="0">
+              <a:solidFill>
+                <a:srgbClr val="FF0000"/>
+              </a:solidFill>
+            </a:endParaRPr>
+          </a:p>
+        </p:txBody>
+      </p:sp>
+    </p:spTree>
+    <p:extLst>
+      <p:ext uri="{BB962C8B-B14F-4D97-AF65-F5344CB8AC3E}">
+        <p14:creationId xmlns:p14="http://schemas.microsoft.com/office/powerpoint/2010/main" val="652006843"/>
+      </p:ext>
+    </p:extLst>
+  </p:cSld>
+  <p:clrMapOvr>
+    <a:masterClrMapping/>
+  </p:clrMapOvr>
+</p:sld>
+</file>
+
+<file path=ppt/slides/slide17.xml><?xml version="1.0" encoding="utf-8"?>
+<p:sld xmlns:a="http://schemas.openxmlformats.org/drawingml/2006/main" xmlns:r="http://schemas.openxmlformats.org/officeDocument/2006/relationships" xmlns:p="http://schemas.openxmlformats.org/presentationml/2006/main">
+  <p:cSld>
+    <p:spTree>
+      <p:nvGrpSpPr>
+        <p:cNvPr id="1" name=""/>
+        <p:cNvGrpSpPr/>
+        <p:nvPr/>
+      </p:nvGrpSpPr>
+      <p:grpSpPr>
+        <a:xfrm>
+          <a:off x="0" y="0"/>
+          <a:ext cx="0" cy="0"/>
+          <a:chOff x="0" y="0"/>
+          <a:chExt cx="0" cy="0"/>
+        </a:xfrm>
+      </p:grpSpPr>
+      <p:sp>
+        <p:nvSpPr>
+          <p:cNvPr id="2" name="Título 1"/>
+          <p:cNvSpPr>
+            <a:spLocks noGrp="1"/>
+          </p:cNvSpPr>
+          <p:nvPr>
+            <p:ph type="title"/>
+          </p:nvPr>
+        </p:nvSpPr>
+        <p:spPr/>
+        <p:txBody>
+          <a:bodyPr/>
+          <a:lstStyle/>
+          <a:p>
+            <a:r>
+              <a:rPr lang="pt-PT" dirty="0" smtClean="0"/>
+              <a:t>Operadores de Substituição</a:t>
+            </a:r>
+            <a:endParaRPr lang="pt-PT" dirty="0"/>
+          </a:p>
+        </p:txBody>
+      </p:sp>
+      <p:sp>
+        <p:nvSpPr>
+          <p:cNvPr id="3" name="Marcador de Posição de Conteúdo 2"/>
+          <p:cNvSpPr>
+            <a:spLocks noGrp="1"/>
+          </p:cNvSpPr>
+          <p:nvPr>
+            <p:ph idx="1"/>
+          </p:nvPr>
+        </p:nvSpPr>
+        <p:spPr/>
+        <p:txBody>
+          <a:bodyPr/>
+          <a:lstStyle/>
+          <a:p>
+            <a:r>
+              <a:rPr lang="pt-PT" dirty="0" err="1" smtClean="0"/>
+              <a:t>Tournament</a:t>
+            </a:r>
+            <a:endParaRPr lang="pt-PT" dirty="0" smtClean="0"/>
+          </a:p>
+          <a:p>
+            <a:endParaRPr lang="pt-PT" dirty="0" smtClean="0"/>
+          </a:p>
+          <a:p>
+            <a:endParaRPr lang="pt-PT" dirty="0" smtClean="0"/>
+          </a:p>
+          <a:p>
+            <a:endParaRPr lang="pt-PT" dirty="0"/>
+          </a:p>
+          <a:p>
+            <a:r>
+              <a:rPr lang="pt-PT" dirty="0" err="1" smtClean="0"/>
+              <a:t>Truncation</a:t>
+            </a:r>
+            <a:endParaRPr lang="pt-PT" dirty="0" smtClean="0"/>
+          </a:p>
+          <a:p>
+            <a:endParaRPr lang="pt-PT" dirty="0" smtClean="0"/>
+          </a:p>
+          <a:p>
+            <a:endParaRPr lang="pt-PT" dirty="0"/>
+          </a:p>
+          <a:p>
+            <a:endParaRPr lang="pt-PT" dirty="0"/>
+          </a:p>
+        </p:txBody>
+      </p:sp>
+      <p:pic>
+        <p:nvPicPr>
+          <p:cNvPr id="4098" name="Picture 2"/>
+          <p:cNvPicPr>
+            <a:picLocks noChangeAspect="1" noChangeArrowheads="1"/>
+          </p:cNvPicPr>
+          <p:nvPr/>
+        </p:nvPicPr>
+        <p:blipFill>
+          <a:blip r:embed="rId2">
+            <a:extLst>
+              <a:ext uri="{28A0092B-C50C-407E-A947-70E740481C1C}">
+                <a14:useLocalDpi xmlns:a14="http://schemas.microsoft.com/office/drawing/2010/main" val="0"/>
+              </a:ext>
+            </a:extLst>
+          </a:blip>
+          <a:srcRect/>
+          <a:stretch>
+            <a:fillRect/>
+          </a:stretch>
+        </p:blipFill>
+        <p:spPr bwMode="auto">
+          <a:xfrm>
+            <a:off x="3186108" y="2276872"/>
+            <a:ext cx="5138899" cy="1183183"/>
+          </a:xfrm>
+          <a:prstGeom prst="rect">
+            <a:avLst/>
+          </a:prstGeom>
+          <a:noFill/>
+          <a:ln>
+            <a:noFill/>
+          </a:ln>
+          <a:effectLst/>
+          <a:extLst>
+            <a:ext uri="{909E8E84-426E-40DD-AFC4-6F175D3DCCD1}">
+              <a14:hiddenFill xmlns:a14="http://schemas.microsoft.com/office/drawing/2010/main">
+                <a:solidFill>
+                  <a:schemeClr val="accent1"/>
+                </a:solidFill>
+              </a14:hiddenFill>
+            </a:ext>
+            <a:ext uri="{91240B29-F687-4F45-9708-019B960494DF}">
+              <a14:hiddenLine xmlns:a14="http://schemas.microsoft.com/office/drawing/2010/main" w="9525">
+                <a:solidFill>
+                  <a:schemeClr val="tx1"/>
+                </a:solidFill>
+                <a:miter lim="800000"/>
+                <a:headEnd/>
+                <a:tailEnd/>
+              </a14:hiddenLine>
+            </a:ext>
+            <a:ext uri="{AF507438-7753-43E0-B8FC-AC1667EBCBE1}">
+              <a14:hiddenEffects xmlns:a14="http://schemas.microsoft.com/office/drawing/2010/main">
+                <a:effectLst>
+                  <a:outerShdw dist="35921" dir="2700000" algn="ctr" rotWithShape="0">
+                    <a:schemeClr val="bg2"/>
+                  </a:outerShdw>
+                </a:effectLst>
+              </a14:hiddenEffects>
+            </a:ext>
+          </a:extLst>
+        </p:spPr>
+      </p:pic>
+      <p:pic>
+        <p:nvPicPr>
+          <p:cNvPr id="4099" name="Picture 3"/>
+          <p:cNvPicPr>
+            <a:picLocks noChangeAspect="1" noChangeArrowheads="1"/>
+          </p:cNvPicPr>
+          <p:nvPr/>
+        </p:nvPicPr>
+        <p:blipFill>
+          <a:blip r:embed="rId3">
+            <a:extLst>
+              <a:ext uri="{28A0092B-C50C-407E-A947-70E740481C1C}">
+                <a14:useLocalDpi xmlns:a14="http://schemas.microsoft.com/office/drawing/2010/main" val="0"/>
+              </a:ext>
+            </a:extLst>
+          </a:blip>
+          <a:srcRect/>
+          <a:stretch>
+            <a:fillRect/>
+          </a:stretch>
+        </p:blipFill>
+        <p:spPr bwMode="auto">
+          <a:xfrm>
+            <a:off x="3186110" y="4599692"/>
+            <a:ext cx="5138899" cy="1192646"/>
+          </a:xfrm>
+          <a:prstGeom prst="rect">
+            <a:avLst/>
+          </a:prstGeom>
+          <a:noFill/>
+          <a:ln>
+            <a:noFill/>
+          </a:ln>
+          <a:effectLst/>
+          <a:extLst>
+            <a:ext uri="{909E8E84-426E-40DD-AFC4-6F175D3DCCD1}">
+              <a14:hiddenFill xmlns:a14="http://schemas.microsoft.com/office/drawing/2010/main">
+                <a:solidFill>
+                  <a:schemeClr val="accent1"/>
+                </a:solidFill>
+              </a14:hiddenFill>
+            </a:ext>
+            <a:ext uri="{91240B29-F687-4F45-9708-019B960494DF}">
+              <a14:hiddenLine xmlns:a14="http://schemas.microsoft.com/office/drawing/2010/main" w="9525">
+                <a:solidFill>
+                  <a:schemeClr val="tx1"/>
+                </a:solidFill>
+                <a:miter lim="800000"/>
+                <a:headEnd/>
+                <a:tailEnd/>
+              </a14:hiddenLine>
+            </a:ext>
+            <a:ext uri="{AF507438-7753-43E0-B8FC-AC1667EBCBE1}">
+              <a14:hiddenEffects xmlns:a14="http://schemas.microsoft.com/office/drawing/2010/main">
+                <a:effectLst>
+                  <a:outerShdw dist="35921" dir="2700000" algn="ctr" rotWithShape="0">
+                    <a:schemeClr val="bg2"/>
+                  </a:outerShdw>
+                </a:effectLst>
+              </a14:hiddenEffects>
+            </a:ext>
+          </a:extLst>
+        </p:spPr>
+      </p:pic>
+    </p:spTree>
+    <p:extLst>
+      <p:ext uri="{BB962C8B-B14F-4D97-AF65-F5344CB8AC3E}">
+        <p14:creationId xmlns:p14="http://schemas.microsoft.com/office/powerpoint/2010/main" val="239640791"/>
+      </p:ext>
+    </p:extLst>
+  </p:cSld>
+  <p:clrMapOvr>
+    <a:masterClrMapping/>
+  </p:clrMapOvr>
+</p:sld>
+</file>
+
+<file path=ppt/slides/slide18.xml><?xml version="1.0" encoding="utf-8"?>
+<p:sld xmlns:a="http://schemas.openxmlformats.org/drawingml/2006/main" xmlns:r="http://schemas.openxmlformats.org/officeDocument/2006/relationships" xmlns:p="http://schemas.openxmlformats.org/presentationml/2006/main">
+  <p:cSld>
+    <p:spTree>
+      <p:nvGrpSpPr>
+        <p:cNvPr id="1" name=""/>
+        <p:cNvGrpSpPr/>
+        <p:nvPr/>
+      </p:nvGrpSpPr>
+      <p:grpSpPr>
+        <a:xfrm>
+          <a:off x="0" y="0"/>
+          <a:ext cx="0" cy="0"/>
+          <a:chOff x="0" y="0"/>
+          <a:chExt cx="0" cy="0"/>
+        </a:xfrm>
+      </p:grpSpPr>
+      <p:sp>
+        <p:nvSpPr>
+          <p:cNvPr id="2" name="Título 1"/>
+          <p:cNvSpPr>
+            <a:spLocks noGrp="1"/>
+          </p:cNvSpPr>
+          <p:nvPr>
+            <p:ph type="title"/>
+          </p:nvPr>
+        </p:nvSpPr>
+        <p:spPr/>
+        <p:txBody>
+          <a:bodyPr/>
+          <a:lstStyle/>
+          <a:p>
+            <a:r>
+              <a:rPr lang="pt-PT" dirty="0" err="1"/>
+              <a:t>Tournament</a:t>
+            </a:r>
+            <a:endParaRPr lang="pt-PT" dirty="0"/>
+          </a:p>
+        </p:txBody>
+      </p:sp>
+      <p:sp>
+        <p:nvSpPr>
+          <p:cNvPr id="3" name="Marcador de Posição de Conteúdo 2"/>
+          <p:cNvSpPr>
+            <a:spLocks noGrp="1"/>
+          </p:cNvSpPr>
+          <p:nvPr>
+            <p:ph idx="1"/>
+          </p:nvPr>
+        </p:nvSpPr>
+        <p:spPr/>
+        <p:txBody>
+          <a:bodyPr/>
+          <a:lstStyle/>
+          <a:p>
+            <a:pPr algn="just"/>
+            <a:r>
+              <a:rPr lang="pt-PT" dirty="0"/>
+              <a:t>Compara se o </a:t>
+            </a:r>
+            <a:r>
+              <a:rPr lang="pt-PT" dirty="0" smtClean="0"/>
+              <a:t>tamanho da população que é definido, é </a:t>
+            </a:r>
+            <a:r>
+              <a:rPr lang="pt-PT" dirty="0"/>
+              <a:t>o numero de </a:t>
+            </a:r>
+            <a:r>
+              <a:rPr lang="pt-PT" dirty="0" smtClean="0"/>
+              <a:t>indivíduos </a:t>
+            </a:r>
+            <a:r>
+              <a:rPr lang="pt-PT" dirty="0"/>
+              <a:t>que sai no </a:t>
+            </a:r>
+            <a:r>
+              <a:rPr lang="pt-PT" dirty="0" smtClean="0"/>
+              <a:t>torneio.</a:t>
+            </a:r>
+          </a:p>
+          <a:p>
+            <a:endParaRPr lang="pt-PT" dirty="0"/>
+          </a:p>
+        </p:txBody>
+      </p:sp>
+    </p:spTree>
+    <p:extLst>
+      <p:ext uri="{BB962C8B-B14F-4D97-AF65-F5344CB8AC3E}">
+        <p14:creationId xmlns:p14="http://schemas.microsoft.com/office/powerpoint/2010/main" val="3373884851"/>
+      </p:ext>
+    </p:extLst>
+  </p:cSld>
+  <p:clrMapOvr>
+    <a:masterClrMapping/>
+  </p:clrMapOvr>
+</p:sld>
+</file>
+
+<file path=ppt/slides/slide19.xml><?xml version="1.0" encoding="utf-8"?>
+<p:sld xmlns:a="http://schemas.openxmlformats.org/drawingml/2006/main" xmlns:r="http://schemas.openxmlformats.org/officeDocument/2006/relationships" xmlns:p="http://schemas.openxmlformats.org/presentationml/2006/main">
+  <p:cSld>
+    <p:spTree>
+      <p:nvGrpSpPr>
+        <p:cNvPr id="1" name=""/>
+        <p:cNvGrpSpPr/>
+        <p:nvPr/>
+      </p:nvGrpSpPr>
+      <p:grpSpPr>
+        <a:xfrm>
+          <a:off x="0" y="0"/>
+          <a:ext cx="0" cy="0"/>
+          <a:chOff x="0" y="0"/>
+          <a:chExt cx="0" cy="0"/>
+        </a:xfrm>
+      </p:grpSpPr>
+      <p:sp>
+        <p:nvSpPr>
+          <p:cNvPr id="2" name="Título 1"/>
+          <p:cNvSpPr>
+            <a:spLocks noGrp="1"/>
+          </p:cNvSpPr>
+          <p:nvPr>
+            <p:ph type="title"/>
+          </p:nvPr>
+        </p:nvSpPr>
+        <p:spPr/>
+        <p:txBody>
+          <a:bodyPr/>
+          <a:lstStyle/>
+          <a:p>
+            <a:r>
+              <a:rPr lang="pt-PT" dirty="0" err="1"/>
+              <a:t>Truncation</a:t>
+            </a:r>
+            <a:endParaRPr lang="pt-PT" dirty="0"/>
+          </a:p>
+        </p:txBody>
+      </p:sp>
+      <p:sp>
+        <p:nvSpPr>
+          <p:cNvPr id="3" name="Marcador de Posição de Conteúdo 2"/>
+          <p:cNvSpPr>
+            <a:spLocks noGrp="1"/>
+          </p:cNvSpPr>
+          <p:nvPr>
+            <p:ph idx="1"/>
+          </p:nvPr>
+        </p:nvSpPr>
+        <p:spPr/>
+        <p:txBody>
+          <a:bodyPr/>
+          <a:lstStyle/>
+          <a:p>
+            <a:pPr algn="just"/>
+            <a:r>
+              <a:rPr lang="pt-PT" dirty="0" smtClean="0"/>
+              <a:t>Verifica </a:t>
+            </a:r>
+            <a:r>
+              <a:rPr lang="pt-PT" dirty="0"/>
+              <a:t>se as populações tem o mesmo </a:t>
+            </a:r>
+            <a:r>
+              <a:rPr lang="pt-PT" dirty="0" smtClean="0"/>
+              <a:t>tamanho</a:t>
+            </a:r>
+          </a:p>
+          <a:p>
+            <a:pPr algn="just"/>
+            <a:endParaRPr lang="pt-PT" dirty="0"/>
+          </a:p>
+          <a:p>
+            <a:pPr algn="just"/>
+            <a:r>
+              <a:rPr lang="pt-PT" dirty="0"/>
+              <a:t>Verifica se foram apenas retirados os 10 </a:t>
+            </a:r>
+            <a:r>
+              <a:rPr lang="pt-PT" dirty="0" smtClean="0"/>
+              <a:t>indivíduos </a:t>
+            </a:r>
+          </a:p>
+          <a:p>
+            <a:pPr lvl="1" algn="just"/>
+            <a:r>
+              <a:rPr lang="pt-PT" dirty="0" smtClean="0"/>
+              <a:t>(exemplo de 10 indivíduos)</a:t>
+            </a:r>
+            <a:endParaRPr lang="pt-PT" dirty="0"/>
+          </a:p>
+        </p:txBody>
+      </p:sp>
+    </p:spTree>
+    <p:extLst>
+      <p:ext uri="{BB962C8B-B14F-4D97-AF65-F5344CB8AC3E}">
+        <p14:creationId xmlns:p14="http://schemas.microsoft.com/office/powerpoint/2010/main" val="1800660541"/>
+      </p:ext>
+    </p:extLst>
+  </p:cSld>
+  <p:clrMapOvr>
+    <a:masterClrMapping/>
+  </p:clrMapOvr>
+</p:sld>
+</file>
+
 <file path=ppt/slides/slide2.xml><?xml version="1.0" encoding="utf-8"?>
 <p:sld xmlns:a="http://schemas.openxmlformats.org/drawingml/2006/main" xmlns:r="http://schemas.openxmlformats.org/officeDocument/2006/relationships" xmlns:p="http://schemas.openxmlformats.org/presentationml/2006/main">
   <p:cSld>
@@ -3278,6 +4635,20 @@
           <a:lstStyle/>
           <a:p>
             <a:r>
+              <a:rPr lang="pt-PT" dirty="0"/>
+              <a:t>Fábio Salvador  </a:t>
+            </a:r>
+            <a:r>
+              <a:rPr lang="pt-PT" dirty="0" smtClean="0"/>
+              <a:t>nº </a:t>
+            </a:r>
+            <a:r>
+              <a:rPr lang="pt-PT" dirty="0"/>
+              <a:t>11464</a:t>
+            </a:r>
+          </a:p>
+          <a:p>
+            <a:r>
               <a:rPr lang="pt-PT" dirty="0" smtClean="0"/>
               <a:t>André </a:t>
             </a:r>
@@ -3301,20 +4672,11 @@
               <a:rPr lang="pt-PT" dirty="0" smtClean="0"/>
               <a:t>13691</a:t>
             </a:r>
-            <a:endParaRPr lang="pt-PT" dirty="0" smtClean="0"/>
           </a:p>
           <a:p>
             <a:r>
               <a:rPr lang="pt-PT" dirty="0" smtClean="0"/>
-              <a:t>Pedro </a:t>
-            </a:r>
-            <a:r>
-              <a:rPr lang="pt-PT" dirty="0" smtClean="0"/>
-              <a:t>Isidoro     nº </a:t>
-            </a:r>
-            <a:r>
-              <a:rPr lang="pt-PT" dirty="0" smtClean="0"/>
-              <a:t>13778</a:t>
+              <a:t>Pedro Isidoro     nº 13778</a:t>
             </a:r>
           </a:p>
           <a:p>
@@ -3326,16 +4688,11 @@
               <a:rPr lang="pt-PT" dirty="0" smtClean="0"/>
               <a:t>13874</a:t>
             </a:r>
-            <a:endParaRPr lang="pt-PT" dirty="0" smtClean="0"/>
           </a:p>
           <a:p>
             <a:r>
               <a:rPr lang="pt-PT" dirty="0" smtClean="0"/>
-              <a:t>Hélio </a:t>
-            </a:r>
-            <a:r>
-              <a:rPr lang="pt-PT" dirty="0" smtClean="0"/>
-              <a:t>Miranda   nº </a:t>
+              <a:t>Hélio Miranda   nº </a:t>
             </a:r>
             <a:r>
               <a:rPr lang="pt-PT" dirty="0"/>
@@ -3352,7 +4709,6 @@
               <a:rPr lang="pt-PT" dirty="0" smtClean="0"/>
               <a:t>15195</a:t>
             </a:r>
-            <a:endParaRPr lang="pt-PT" dirty="0" smtClean="0"/>
           </a:p>
         </p:txBody>
       </p:sp>
@@ -3360,6 +4716,109 @@
     <p:extLst>
       <p:ext uri="{BB962C8B-B14F-4D97-AF65-F5344CB8AC3E}">
         <p14:creationId xmlns:p14="http://schemas.microsoft.com/office/powerpoint/2010/main" val="1355391077"/>
+      </p:ext>
+    </p:extLst>
+  </p:cSld>
+  <p:clrMapOvr>
+    <a:masterClrMapping/>
+  </p:clrMapOvr>
+</p:sld>
+</file>
+
+<file path=ppt/slides/slide20.xml><?xml version="1.0" encoding="utf-8"?>
+<p:sld xmlns:a="http://schemas.openxmlformats.org/drawingml/2006/main" xmlns:r="http://schemas.openxmlformats.org/officeDocument/2006/relationships" xmlns:p="http://schemas.openxmlformats.org/presentationml/2006/main">
+  <p:cSld>
+    <p:spTree>
+      <p:nvGrpSpPr>
+        <p:cNvPr id="1" name=""/>
+        <p:cNvGrpSpPr/>
+        <p:nvPr/>
+      </p:nvGrpSpPr>
+      <p:grpSpPr>
+        <a:xfrm>
+          <a:off x="0" y="0"/>
+          <a:ext cx="0" cy="0"/>
+          <a:chOff x="0" y="0"/>
+          <a:chExt cx="0" cy="0"/>
+        </a:xfrm>
+      </p:grpSpPr>
+      <p:sp>
+        <p:nvSpPr>
+          <p:cNvPr id="2" name="Título 1"/>
+          <p:cNvSpPr>
+            <a:spLocks noGrp="1"/>
+          </p:cNvSpPr>
+          <p:nvPr>
+            <p:ph type="title"/>
+          </p:nvPr>
+        </p:nvSpPr>
+        <p:spPr/>
+        <p:txBody>
+          <a:bodyPr/>
+          <a:lstStyle/>
+          <a:p>
+            <a:endParaRPr lang="pt-PT"/>
+          </a:p>
+        </p:txBody>
+      </p:sp>
+      <p:sp>
+        <p:nvSpPr>
+          <p:cNvPr id="3" name="Marcador de Posição de Conteúdo 2"/>
+          <p:cNvSpPr>
+            <a:spLocks noGrp="1"/>
+          </p:cNvSpPr>
+          <p:nvPr>
+            <p:ph idx="1"/>
+          </p:nvPr>
+        </p:nvSpPr>
+        <p:spPr/>
+        <p:txBody>
+          <a:bodyPr>
+            <a:normAutofit/>
+          </a:bodyPr>
+          <a:lstStyle/>
+          <a:p>
+            <a:r>
+              <a:rPr lang="pt-PT" sz="5400" dirty="0" smtClean="0">
+                <a:solidFill>
+                  <a:srgbClr val="FF0000"/>
+                </a:solidFill>
+              </a:rPr>
+              <a:t>FALTA ALGUNS TESTES, COMO É </a:t>
+            </a:r>
+          </a:p>
+          <a:p>
+            <a:pPr marL="0" indent="0">
+              <a:buNone/>
+            </a:pPr>
+            <a:r>
+              <a:rPr lang="pt-PT" sz="8000" dirty="0" smtClean="0">
+                <a:solidFill>
+                  <a:srgbClr val="FF0000"/>
+                </a:solidFill>
+              </a:rPr>
+              <a:t>PEDRO ALVES</a:t>
+            </a:r>
+            <a:r>
+              <a:rPr lang="pt-PT" sz="5400" dirty="0" smtClean="0">
+                <a:solidFill>
+                  <a:srgbClr val="FF0000"/>
+                </a:solidFill>
+              </a:rPr>
+              <a:t>? </a:t>
+            </a:r>
+            <a:endParaRPr lang="pt-PT" sz="5400" dirty="0">
+              <a:solidFill>
+                <a:srgbClr val="FF0000"/>
+              </a:solidFill>
+            </a:endParaRPr>
+          </a:p>
+        </p:txBody>
+      </p:sp>
+    </p:spTree>
+    <p:extLst>
+      <p:ext uri="{BB962C8B-B14F-4D97-AF65-F5344CB8AC3E}">
+        <p14:creationId xmlns:p14="http://schemas.microsoft.com/office/powerpoint/2010/main" val="1672250053"/>
       </p:ext>
     </p:extLst>
   </p:cSld>
@@ -3498,7 +4957,11 @@
           <a:p>
             <a:r>
               <a:rPr lang="pt-PT" dirty="0" smtClean="0"/>
-              <a:t>(dizer quais testes foram feitos)</a:t>
+              <a:t>(</a:t>
+            </a:r>
+            <a:r>
+              <a:rPr lang="pt-PT" dirty="0" smtClean="0"/>
+              <a:t>dizer quais testes foram feitos)</a:t>
             </a:r>
           </a:p>
           <a:p>
@@ -3514,6 +4977,942 @@
     <p:extLst>
       <p:ext uri="{BB962C8B-B14F-4D97-AF65-F5344CB8AC3E}">
         <p14:creationId xmlns:p14="http://schemas.microsoft.com/office/powerpoint/2010/main" val="1393827857"/>
+      </p:ext>
+    </p:extLst>
+  </p:cSld>
+  <p:clrMapOvr>
+    <a:masterClrMapping/>
+  </p:clrMapOvr>
+</p:sld>
+</file>
+
+<file path=ppt/slides/slide5.xml><?xml version="1.0" encoding="utf-8"?>
+<p:sld xmlns:a="http://schemas.openxmlformats.org/drawingml/2006/main" xmlns:r="http://schemas.openxmlformats.org/officeDocument/2006/relationships" xmlns:p="http://schemas.openxmlformats.org/presentationml/2006/main">
+  <p:cSld>
+    <p:spTree>
+      <p:nvGrpSpPr>
+        <p:cNvPr id="1" name=""/>
+        <p:cNvGrpSpPr/>
+        <p:nvPr/>
+      </p:nvGrpSpPr>
+      <p:grpSpPr>
+        <a:xfrm>
+          <a:off x="0" y="0"/>
+          <a:ext cx="0" cy="0"/>
+          <a:chOff x="0" y="0"/>
+          <a:chExt cx="0" cy="0"/>
+        </a:xfrm>
+      </p:grpSpPr>
+      <p:sp>
+        <p:nvSpPr>
+          <p:cNvPr id="2" name="Título 1"/>
+          <p:cNvSpPr>
+            <a:spLocks noGrp="1"/>
+          </p:cNvSpPr>
+          <p:nvPr>
+            <p:ph type="title"/>
+          </p:nvPr>
+        </p:nvSpPr>
+        <p:spPr/>
+        <p:txBody>
+          <a:bodyPr/>
+          <a:lstStyle/>
+          <a:p>
+            <a:r>
+              <a:rPr lang="pt-PT" dirty="0" smtClean="0"/>
+              <a:t>Operadores de Selecção</a:t>
+            </a:r>
+            <a:endParaRPr lang="pt-PT" dirty="0"/>
+          </a:p>
+        </p:txBody>
+      </p:sp>
+      <p:sp>
+        <p:nvSpPr>
+          <p:cNvPr id="3" name="Marcador de Posição de Conteúdo 2"/>
+          <p:cNvSpPr>
+            <a:spLocks noGrp="1"/>
+          </p:cNvSpPr>
+          <p:nvPr>
+            <p:ph idx="1"/>
+          </p:nvPr>
+        </p:nvSpPr>
+        <p:spPr/>
+        <p:txBody>
+          <a:bodyPr/>
+          <a:lstStyle/>
+          <a:p>
+            <a:r>
+              <a:rPr lang="pt-PT" dirty="0" smtClean="0"/>
+              <a:t>Torneio </a:t>
+            </a:r>
+            <a:r>
+              <a:rPr lang="pt-PT" dirty="0" smtClean="0">
+                <a:solidFill>
+                  <a:srgbClr val="FF0000"/>
+                </a:solidFill>
+              </a:rPr>
+              <a:t>(TÁ A FALHAR)</a:t>
+            </a:r>
+          </a:p>
+          <a:p>
+            <a:endParaRPr lang="pt-PT" dirty="0" smtClean="0"/>
+          </a:p>
+          <a:p>
+            <a:endParaRPr lang="pt-PT" dirty="0" smtClean="0"/>
+          </a:p>
+          <a:p>
+            <a:r>
+              <a:rPr lang="pt-PT" dirty="0" smtClean="0"/>
+              <a:t>SUS</a:t>
+            </a:r>
+          </a:p>
+          <a:p>
+            <a:endParaRPr lang="pt-PT" dirty="0" smtClean="0"/>
+          </a:p>
+          <a:p>
+            <a:endParaRPr lang="pt-PT" dirty="0" smtClean="0"/>
+          </a:p>
+          <a:p>
+            <a:r>
+              <a:rPr lang="pt-PT" dirty="0" smtClean="0"/>
+              <a:t>Roleta</a:t>
+            </a:r>
+          </a:p>
+          <a:p>
+            <a:endParaRPr lang="pt-PT" dirty="0" smtClean="0"/>
+          </a:p>
+          <a:p>
+            <a:endParaRPr lang="pt-PT" dirty="0" smtClean="0"/>
+          </a:p>
+          <a:p>
+            <a:endParaRPr lang="pt-PT" dirty="0" smtClean="0"/>
+          </a:p>
+          <a:p>
+            <a:endParaRPr lang="pt-PT" dirty="0"/>
+          </a:p>
+        </p:txBody>
+      </p:sp>
+      <p:pic>
+        <p:nvPicPr>
+          <p:cNvPr id="1027" name="Picture 3"/>
+          <p:cNvPicPr>
+            <a:picLocks noChangeAspect="1" noChangeArrowheads="1"/>
+          </p:cNvPicPr>
+          <p:nvPr/>
+        </p:nvPicPr>
+        <p:blipFill>
+          <a:blip r:embed="rId2">
+            <a:extLst>
+              <a:ext uri="{28A0092B-C50C-407E-A947-70E740481C1C}">
+                <a14:useLocalDpi xmlns:a14="http://schemas.microsoft.com/office/drawing/2010/main" val="0"/>
+              </a:ext>
+            </a:extLst>
+          </a:blip>
+          <a:srcRect/>
+          <a:stretch>
+            <a:fillRect/>
+          </a:stretch>
+        </p:blipFill>
+        <p:spPr bwMode="auto">
+          <a:xfrm>
+            <a:off x="2359198" y="3933056"/>
+            <a:ext cx="3880820" cy="1111175"/>
+          </a:xfrm>
+          <a:prstGeom prst="rect">
+            <a:avLst/>
+          </a:prstGeom>
+          <a:noFill/>
+          <a:ln>
+            <a:noFill/>
+          </a:ln>
+          <a:effectLst/>
+          <a:extLst>
+            <a:ext uri="{909E8E84-426E-40DD-AFC4-6F175D3DCCD1}">
+              <a14:hiddenFill xmlns:a14="http://schemas.microsoft.com/office/drawing/2010/main">
+                <a:solidFill>
+                  <a:schemeClr val="accent1"/>
+                </a:solidFill>
+              </a14:hiddenFill>
+            </a:ext>
+            <a:ext uri="{91240B29-F687-4F45-9708-019B960494DF}">
+              <a14:hiddenLine xmlns:a14="http://schemas.microsoft.com/office/drawing/2010/main" w="9525">
+                <a:solidFill>
+                  <a:schemeClr val="tx1"/>
+                </a:solidFill>
+                <a:miter lim="800000"/>
+                <a:headEnd/>
+                <a:tailEnd/>
+              </a14:hiddenLine>
+            </a:ext>
+            <a:ext uri="{AF507438-7753-43E0-B8FC-AC1667EBCBE1}">
+              <a14:hiddenEffects xmlns:a14="http://schemas.microsoft.com/office/drawing/2010/main">
+                <a:effectLst>
+                  <a:outerShdw dist="35921" dir="2700000" algn="ctr" rotWithShape="0">
+                    <a:schemeClr val="bg2"/>
+                  </a:outerShdw>
+                </a:effectLst>
+              </a14:hiddenEffects>
+            </a:ext>
+          </a:extLst>
+        </p:spPr>
+      </p:pic>
+      <p:pic>
+        <p:nvPicPr>
+          <p:cNvPr id="1028" name="Picture 4"/>
+          <p:cNvPicPr>
+            <a:picLocks noChangeAspect="1" noChangeArrowheads="1"/>
+          </p:cNvPicPr>
+          <p:nvPr/>
+        </p:nvPicPr>
+        <p:blipFill>
+          <a:blip r:embed="rId3">
+            <a:extLst>
+              <a:ext uri="{28A0092B-C50C-407E-A947-70E740481C1C}">
+                <a14:useLocalDpi xmlns:a14="http://schemas.microsoft.com/office/drawing/2010/main" val="0"/>
+              </a:ext>
+            </a:extLst>
+          </a:blip>
+          <a:srcRect/>
+          <a:stretch>
+            <a:fillRect/>
+          </a:stretch>
+        </p:blipFill>
+        <p:spPr bwMode="auto">
+          <a:xfrm>
+            <a:off x="2359198" y="5761772"/>
+            <a:ext cx="3880820" cy="921128"/>
+          </a:xfrm>
+          <a:prstGeom prst="rect">
+            <a:avLst/>
+          </a:prstGeom>
+          <a:noFill/>
+          <a:ln>
+            <a:noFill/>
+          </a:ln>
+          <a:effectLst/>
+          <a:extLst>
+            <a:ext uri="{909E8E84-426E-40DD-AFC4-6F175D3DCCD1}">
+              <a14:hiddenFill xmlns:a14="http://schemas.microsoft.com/office/drawing/2010/main">
+                <a:solidFill>
+                  <a:schemeClr val="accent1"/>
+                </a:solidFill>
+              </a14:hiddenFill>
+            </a:ext>
+            <a:ext uri="{91240B29-F687-4F45-9708-019B960494DF}">
+              <a14:hiddenLine xmlns:a14="http://schemas.microsoft.com/office/drawing/2010/main" w="9525">
+                <a:solidFill>
+                  <a:schemeClr val="tx1"/>
+                </a:solidFill>
+                <a:miter lim="800000"/>
+                <a:headEnd/>
+                <a:tailEnd/>
+              </a14:hiddenLine>
+            </a:ext>
+            <a:ext uri="{AF507438-7753-43E0-B8FC-AC1667EBCBE1}">
+              <a14:hiddenEffects xmlns:a14="http://schemas.microsoft.com/office/drawing/2010/main">
+                <a:effectLst>
+                  <a:outerShdw dist="35921" dir="2700000" algn="ctr" rotWithShape="0">
+                    <a:schemeClr val="bg2"/>
+                  </a:outerShdw>
+                </a:effectLst>
+              </a14:hiddenEffects>
+            </a:ext>
+          </a:extLst>
+        </p:spPr>
+      </p:pic>
+    </p:spTree>
+    <p:extLst>
+      <p:ext uri="{BB962C8B-B14F-4D97-AF65-F5344CB8AC3E}">
+        <p14:creationId xmlns:p14="http://schemas.microsoft.com/office/powerpoint/2010/main" val="3354833501"/>
+      </p:ext>
+    </p:extLst>
+  </p:cSld>
+  <p:clrMapOvr>
+    <a:masterClrMapping/>
+  </p:clrMapOvr>
+</p:sld>
+</file>
+
+<file path=ppt/slides/slide6.xml><?xml version="1.0" encoding="utf-8"?>
+<p:sld xmlns:a="http://schemas.openxmlformats.org/drawingml/2006/main" xmlns:r="http://schemas.openxmlformats.org/officeDocument/2006/relationships" xmlns:p="http://schemas.openxmlformats.org/presentationml/2006/main">
+  <p:cSld>
+    <p:spTree>
+      <p:nvGrpSpPr>
+        <p:cNvPr id="1" name=""/>
+        <p:cNvGrpSpPr/>
+        <p:nvPr/>
+      </p:nvGrpSpPr>
+      <p:grpSpPr>
+        <a:xfrm>
+          <a:off x="0" y="0"/>
+          <a:ext cx="0" cy="0"/>
+          <a:chOff x="0" y="0"/>
+          <a:chExt cx="0" cy="0"/>
+        </a:xfrm>
+      </p:grpSpPr>
+      <p:sp>
+        <p:nvSpPr>
+          <p:cNvPr id="2" name="Título 1"/>
+          <p:cNvSpPr>
+            <a:spLocks noGrp="1"/>
+          </p:cNvSpPr>
+          <p:nvPr>
+            <p:ph type="title"/>
+          </p:nvPr>
+        </p:nvSpPr>
+        <p:spPr/>
+        <p:txBody>
+          <a:bodyPr/>
+          <a:lstStyle/>
+          <a:p>
+            <a:r>
+              <a:rPr lang="pt-PT" dirty="0" smtClean="0"/>
+              <a:t>Torneio</a:t>
+            </a:r>
+            <a:endParaRPr lang="pt-PT" dirty="0"/>
+          </a:p>
+        </p:txBody>
+      </p:sp>
+      <p:sp>
+        <p:nvSpPr>
+          <p:cNvPr id="3" name="Marcador de Posição de Conteúdo 2"/>
+          <p:cNvSpPr>
+            <a:spLocks noGrp="1"/>
+          </p:cNvSpPr>
+          <p:nvPr>
+            <p:ph idx="1"/>
+          </p:nvPr>
+        </p:nvSpPr>
+        <p:spPr/>
+        <p:txBody>
+          <a:bodyPr/>
+          <a:lstStyle/>
+          <a:p>
+            <a:endParaRPr lang="pt-PT"/>
+          </a:p>
+        </p:txBody>
+      </p:sp>
+    </p:spTree>
+    <p:extLst>
+      <p:ext uri="{BB962C8B-B14F-4D97-AF65-F5344CB8AC3E}">
+        <p14:creationId xmlns:p14="http://schemas.microsoft.com/office/powerpoint/2010/main" val="1057326803"/>
+      </p:ext>
+    </p:extLst>
+  </p:cSld>
+  <p:clrMapOvr>
+    <a:masterClrMapping/>
+  </p:clrMapOvr>
+</p:sld>
+</file>
+
+<file path=ppt/slides/slide7.xml><?xml version="1.0" encoding="utf-8"?>
+<p:sld xmlns:a="http://schemas.openxmlformats.org/drawingml/2006/main" xmlns:r="http://schemas.openxmlformats.org/officeDocument/2006/relationships" xmlns:p="http://schemas.openxmlformats.org/presentationml/2006/main">
+  <p:cSld>
+    <p:spTree>
+      <p:nvGrpSpPr>
+        <p:cNvPr id="1" name=""/>
+        <p:cNvGrpSpPr/>
+        <p:nvPr/>
+      </p:nvGrpSpPr>
+      <p:grpSpPr>
+        <a:xfrm>
+          <a:off x="0" y="0"/>
+          <a:ext cx="0" cy="0"/>
+          <a:chOff x="0" y="0"/>
+          <a:chExt cx="0" cy="0"/>
+        </a:xfrm>
+      </p:grpSpPr>
+      <p:sp>
+        <p:nvSpPr>
+          <p:cNvPr id="2" name="Título 1"/>
+          <p:cNvSpPr>
+            <a:spLocks noGrp="1"/>
+          </p:cNvSpPr>
+          <p:nvPr>
+            <p:ph type="title"/>
+          </p:nvPr>
+        </p:nvSpPr>
+        <p:spPr/>
+        <p:txBody>
+          <a:bodyPr/>
+          <a:lstStyle/>
+          <a:p>
+            <a:r>
+              <a:rPr lang="pt-PT" dirty="0" smtClean="0"/>
+              <a:t>SUS</a:t>
+            </a:r>
+            <a:endParaRPr lang="pt-PT" dirty="0"/>
+          </a:p>
+        </p:txBody>
+      </p:sp>
+      <p:sp>
+        <p:nvSpPr>
+          <p:cNvPr id="3" name="Marcador de Posição de Conteúdo 2"/>
+          <p:cNvSpPr>
+            <a:spLocks noGrp="1"/>
+          </p:cNvSpPr>
+          <p:nvPr>
+            <p:ph idx="1"/>
+          </p:nvPr>
+        </p:nvSpPr>
+        <p:spPr>
+          <a:xfrm>
+            <a:off x="469293" y="1124744"/>
+            <a:ext cx="8686800" cy="5733256"/>
+          </a:xfrm>
+        </p:spPr>
+        <p:txBody>
+          <a:bodyPr>
+            <a:normAutofit lnSpcReduction="10000"/>
+          </a:bodyPr>
+          <a:lstStyle/>
+          <a:p>
+            <a:pPr algn="just"/>
+            <a:r>
+              <a:rPr lang="pt-PT" sz="2400" dirty="0" smtClean="0"/>
+              <a:t>Teste ao numero aleatório que é gerado para o valor aleatório</a:t>
+            </a:r>
+          </a:p>
+          <a:p>
+            <a:pPr lvl="1" algn="just"/>
+            <a:r>
+              <a:rPr lang="pt-PT" sz="2400" dirty="0" smtClean="0"/>
+              <a:t>Conta </a:t>
+            </a:r>
+            <a:r>
+              <a:rPr lang="pt-PT" sz="2400" dirty="0"/>
+              <a:t>o numero de vezes em que sai os </a:t>
+            </a:r>
+            <a:r>
+              <a:rPr lang="pt-PT" sz="2400" dirty="0" smtClean="0"/>
+              <a:t>números</a:t>
+            </a:r>
+          </a:p>
+          <a:p>
+            <a:pPr marL="457200" lvl="1" indent="0" algn="just">
+              <a:buNone/>
+            </a:pPr>
+            <a:endParaRPr lang="pt-PT" sz="2400" dirty="0" smtClean="0"/>
+          </a:p>
+          <a:p>
+            <a:pPr algn="just"/>
+            <a:r>
+              <a:rPr lang="pt-PT" sz="2400" dirty="0"/>
+              <a:t> </a:t>
+            </a:r>
+            <a:r>
+              <a:rPr lang="pt-PT" sz="2400" dirty="0" smtClean="0"/>
+              <a:t>Teste ao numero aleatório que é gerado para o valor aleatório</a:t>
+            </a:r>
+          </a:p>
+          <a:p>
+            <a:pPr lvl="1" algn="just"/>
+            <a:r>
+              <a:rPr lang="pt-PT" sz="2400" dirty="0" smtClean="0"/>
+              <a:t>Testa </a:t>
+            </a:r>
+            <a:r>
+              <a:rPr lang="pt-PT" sz="2400" dirty="0"/>
+              <a:t>se há </a:t>
+            </a:r>
+            <a:r>
+              <a:rPr lang="pt-PT" sz="2400" dirty="0" smtClean="0"/>
+              <a:t>sequencia</a:t>
+            </a:r>
+          </a:p>
+          <a:p>
+            <a:pPr marL="457200" lvl="1" indent="0" algn="just">
+              <a:buNone/>
+            </a:pPr>
+            <a:endParaRPr lang="pt-PT" sz="2400" dirty="0" smtClean="0"/>
+          </a:p>
+          <a:p>
+            <a:pPr algn="just"/>
+            <a:r>
+              <a:rPr lang="pt-PT" sz="2400" dirty="0" smtClean="0"/>
+              <a:t>Teste </a:t>
+            </a:r>
+            <a:r>
+              <a:rPr lang="pt-PT" sz="2400" dirty="0"/>
+              <a:t>ao numero de </a:t>
+            </a:r>
+            <a:r>
+              <a:rPr lang="pt-PT" sz="2400" dirty="0" smtClean="0"/>
+              <a:t>indivíduos </a:t>
+            </a:r>
+            <a:r>
+              <a:rPr lang="pt-PT" sz="2400" dirty="0"/>
+              <a:t>da população </a:t>
+            </a:r>
+            <a:endParaRPr lang="pt-PT" sz="2400" dirty="0" smtClean="0"/>
+          </a:p>
+          <a:p>
+            <a:pPr lvl="1" algn="just"/>
+            <a:r>
+              <a:rPr lang="pt-PT" sz="2400" dirty="0" smtClean="0"/>
+              <a:t>Testa se o que </a:t>
+            </a:r>
+            <a:r>
+              <a:rPr lang="pt-PT" sz="2400" dirty="0"/>
+              <a:t>sai é </a:t>
+            </a:r>
+            <a:r>
+              <a:rPr lang="pt-PT" sz="2400" dirty="0" smtClean="0"/>
+              <a:t>&lt; = </a:t>
+            </a:r>
+            <a:r>
+              <a:rPr lang="pt-PT" sz="2400" dirty="0"/>
+              <a:t>ao numero de </a:t>
+            </a:r>
+            <a:r>
+              <a:rPr lang="pt-PT" sz="2400" dirty="0" smtClean="0"/>
+              <a:t>indivíduos </a:t>
+            </a:r>
+            <a:r>
+              <a:rPr lang="pt-PT" sz="2400" dirty="0"/>
+              <a:t>da população que </a:t>
+            </a:r>
+            <a:r>
+              <a:rPr lang="pt-PT" sz="2400" dirty="0" smtClean="0"/>
+              <a:t>entra</a:t>
+            </a:r>
+          </a:p>
+          <a:p>
+            <a:pPr lvl="1" algn="just"/>
+            <a:r>
+              <a:rPr lang="pt-PT" sz="2400" dirty="0" smtClean="0"/>
+              <a:t>Testa </a:t>
+            </a:r>
+            <a:r>
+              <a:rPr lang="pt-PT" sz="2400" dirty="0"/>
+              <a:t>se os </a:t>
+            </a:r>
+            <a:r>
+              <a:rPr lang="pt-PT" sz="2400" dirty="0" smtClean="0"/>
+              <a:t>indivíduos </a:t>
+            </a:r>
+            <a:r>
+              <a:rPr lang="pt-PT" sz="2400" dirty="0"/>
+              <a:t>da população de </a:t>
+            </a:r>
+            <a:r>
+              <a:rPr lang="pt-PT" sz="2400" dirty="0" smtClean="0"/>
+              <a:t>saída </a:t>
+            </a:r>
+            <a:r>
+              <a:rPr lang="pt-PT" sz="2400" dirty="0"/>
+              <a:t>existem na população de </a:t>
+            </a:r>
+            <a:r>
+              <a:rPr lang="pt-PT" sz="2400" dirty="0" smtClean="0"/>
+              <a:t>origem</a:t>
+            </a:r>
+          </a:p>
+          <a:p>
+            <a:pPr lvl="1" algn="just"/>
+            <a:r>
+              <a:rPr lang="pt-PT" sz="2400" dirty="0" smtClean="0"/>
+              <a:t>Testa se os indivíduos </a:t>
+            </a:r>
+            <a:r>
+              <a:rPr lang="pt-PT" sz="2400" dirty="0"/>
+              <a:t>da população que sai é </a:t>
+            </a:r>
+            <a:r>
+              <a:rPr lang="pt-PT" sz="2400" dirty="0" smtClean="0"/>
+              <a:t>igual </a:t>
+            </a:r>
+            <a:r>
+              <a:rPr lang="pt-PT" sz="2400" dirty="0"/>
+              <a:t>ao numero de </a:t>
+            </a:r>
+            <a:r>
+              <a:rPr lang="pt-PT" sz="2400" dirty="0" smtClean="0"/>
+              <a:t>indivíduos </a:t>
+            </a:r>
+            <a:r>
+              <a:rPr lang="pt-PT" sz="2400" dirty="0"/>
+              <a:t>que definimos inicialmente para serem seleccionados </a:t>
+            </a:r>
+          </a:p>
+        </p:txBody>
+      </p:sp>
+    </p:spTree>
+    <p:extLst>
+      <p:ext uri="{BB962C8B-B14F-4D97-AF65-F5344CB8AC3E}">
+        <p14:creationId xmlns:p14="http://schemas.microsoft.com/office/powerpoint/2010/main" val="2755377132"/>
+      </p:ext>
+    </p:extLst>
+  </p:cSld>
+  <p:clrMapOvr>
+    <a:masterClrMapping/>
+  </p:clrMapOvr>
+</p:sld>
+</file>
+
+<file path=ppt/slides/slide8.xml><?xml version="1.0" encoding="utf-8"?>
+<p:sld xmlns:a="http://schemas.openxmlformats.org/drawingml/2006/main" xmlns:r="http://schemas.openxmlformats.org/officeDocument/2006/relationships" xmlns:p="http://schemas.openxmlformats.org/presentationml/2006/main">
+  <p:cSld>
+    <p:spTree>
+      <p:nvGrpSpPr>
+        <p:cNvPr id="1" name=""/>
+        <p:cNvGrpSpPr/>
+        <p:nvPr/>
+      </p:nvGrpSpPr>
+      <p:grpSpPr>
+        <a:xfrm>
+          <a:off x="0" y="0"/>
+          <a:ext cx="0" cy="0"/>
+          <a:chOff x="0" y="0"/>
+          <a:chExt cx="0" cy="0"/>
+        </a:xfrm>
+      </p:grpSpPr>
+      <p:sp>
+        <p:nvSpPr>
+          <p:cNvPr id="2" name="Título 1"/>
+          <p:cNvSpPr>
+            <a:spLocks noGrp="1"/>
+          </p:cNvSpPr>
+          <p:nvPr>
+            <p:ph type="title"/>
+          </p:nvPr>
+        </p:nvSpPr>
+        <p:spPr/>
+        <p:txBody>
+          <a:bodyPr/>
+          <a:lstStyle/>
+          <a:p>
+            <a:r>
+              <a:rPr lang="pt-PT" dirty="0" smtClean="0"/>
+              <a:t>Roleta</a:t>
+            </a:r>
+            <a:endParaRPr lang="pt-PT" dirty="0"/>
+          </a:p>
+        </p:txBody>
+      </p:sp>
+      <p:sp>
+        <p:nvSpPr>
+          <p:cNvPr id="3" name="Marcador de Posição de Conteúdo 2"/>
+          <p:cNvSpPr>
+            <a:spLocks noGrp="1"/>
+          </p:cNvSpPr>
+          <p:nvPr>
+            <p:ph idx="1"/>
+          </p:nvPr>
+        </p:nvSpPr>
+        <p:spPr/>
+        <p:txBody>
+          <a:bodyPr/>
+          <a:lstStyle/>
+          <a:p>
+            <a:r>
+              <a:rPr lang="pt-PT" dirty="0" smtClean="0"/>
+              <a:t>Vê </a:t>
+            </a:r>
+            <a:r>
+              <a:rPr lang="pt-PT" dirty="0"/>
+              <a:t>se o ponto aleatório está ente 0 e 1 </a:t>
+            </a:r>
+            <a:r>
+              <a:rPr lang="pt-PT" dirty="0" smtClean="0"/>
+              <a:t>	</a:t>
+            </a:r>
+          </a:p>
+          <a:p>
+            <a:pPr lvl="1"/>
+            <a:r>
+              <a:rPr lang="pt-PT" dirty="0" smtClean="0"/>
+              <a:t> </a:t>
+            </a:r>
+            <a:r>
+              <a:rPr lang="pt-PT" dirty="0"/>
+              <a:t>(0-maxFitness)/</a:t>
+            </a:r>
+            <a:r>
+              <a:rPr lang="pt-PT" dirty="0" err="1" smtClean="0"/>
+              <a:t>maxFitness</a:t>
+            </a:r>
+            <a:r>
+              <a:rPr lang="pt-PT" dirty="0" smtClean="0"/>
+              <a:t>.</a:t>
+            </a:r>
+          </a:p>
+          <a:p>
+            <a:endParaRPr lang="pt-PT" dirty="0" smtClean="0"/>
+          </a:p>
+          <a:p>
+            <a:r>
+              <a:rPr lang="pt-PT" dirty="0"/>
+              <a:t>Vê se </a:t>
+            </a:r>
+            <a:r>
+              <a:rPr lang="pt-PT" dirty="0" smtClean="0"/>
+              <a:t>indivíduos </a:t>
+            </a:r>
+            <a:r>
+              <a:rPr lang="pt-PT" dirty="0"/>
+              <a:t>da </a:t>
+            </a:r>
+            <a:r>
+              <a:rPr lang="pt-PT" dirty="0" smtClean="0"/>
+              <a:t>população de saída fazem </a:t>
+            </a:r>
+            <a:r>
+              <a:rPr lang="pt-PT" dirty="0"/>
+              <a:t>parte da </a:t>
+            </a:r>
+            <a:r>
+              <a:rPr lang="pt-PT" dirty="0" smtClean="0"/>
+              <a:t>população de entrada.</a:t>
+            </a:r>
+          </a:p>
+        </p:txBody>
+      </p:sp>
+    </p:spTree>
+    <p:extLst>
+      <p:ext uri="{BB962C8B-B14F-4D97-AF65-F5344CB8AC3E}">
+        <p14:creationId xmlns:p14="http://schemas.microsoft.com/office/powerpoint/2010/main" val="998993882"/>
+      </p:ext>
+    </p:extLst>
+  </p:cSld>
+  <p:clrMapOvr>
+    <a:masterClrMapping/>
+  </p:clrMapOvr>
+</p:sld>
+</file>
+
+<file path=ppt/slides/slide9.xml><?xml version="1.0" encoding="utf-8"?>
+<p:sld xmlns:a="http://schemas.openxmlformats.org/drawingml/2006/main" xmlns:r="http://schemas.openxmlformats.org/officeDocument/2006/relationships" xmlns:p="http://schemas.openxmlformats.org/presentationml/2006/main">
+  <p:cSld>
+    <p:spTree>
+      <p:nvGrpSpPr>
+        <p:cNvPr id="1" name=""/>
+        <p:cNvGrpSpPr/>
+        <p:nvPr/>
+      </p:nvGrpSpPr>
+      <p:grpSpPr>
+        <a:xfrm>
+          <a:off x="0" y="0"/>
+          <a:ext cx="0" cy="0"/>
+          <a:chOff x="0" y="0"/>
+          <a:chExt cx="0" cy="0"/>
+        </a:xfrm>
+      </p:grpSpPr>
+      <p:sp>
+        <p:nvSpPr>
+          <p:cNvPr id="2" name="Título 1"/>
+          <p:cNvSpPr>
+            <a:spLocks noGrp="1"/>
+          </p:cNvSpPr>
+          <p:nvPr>
+            <p:ph type="title"/>
+          </p:nvPr>
+        </p:nvSpPr>
+        <p:spPr/>
+        <p:txBody>
+          <a:bodyPr/>
+          <a:lstStyle/>
+          <a:p>
+            <a:r>
+              <a:rPr lang="pt-PT" dirty="0" smtClean="0"/>
+              <a:t>Operadores de Recombinação</a:t>
+            </a:r>
+            <a:endParaRPr lang="pt-PT" dirty="0"/>
+          </a:p>
+        </p:txBody>
+      </p:sp>
+      <p:sp>
+        <p:nvSpPr>
+          <p:cNvPr id="3" name="Marcador de Posição de Conteúdo 2"/>
+          <p:cNvSpPr>
+            <a:spLocks noGrp="1"/>
+          </p:cNvSpPr>
+          <p:nvPr>
+            <p:ph idx="1"/>
+          </p:nvPr>
+        </p:nvSpPr>
+        <p:spPr/>
+        <p:txBody>
+          <a:bodyPr/>
+          <a:lstStyle/>
+          <a:p>
+            <a:r>
+              <a:rPr lang="pt-PT" dirty="0" err="1" smtClean="0"/>
+              <a:t>Crossover</a:t>
+            </a:r>
+            <a:r>
+              <a:rPr lang="pt-PT" dirty="0" smtClean="0"/>
+              <a:t> </a:t>
+            </a:r>
+            <a:r>
+              <a:rPr lang="pt-PT" dirty="0">
+                <a:solidFill>
+                  <a:srgbClr val="FF0000"/>
+                </a:solidFill>
+              </a:rPr>
+              <a:t>(TÁ A FALHAR)</a:t>
+            </a:r>
+          </a:p>
+          <a:p>
+            <a:endParaRPr lang="pt-PT" dirty="0"/>
+          </a:p>
+          <a:p>
+            <a:r>
+              <a:rPr lang="pt-PT" dirty="0" smtClean="0"/>
+              <a:t>Uniforme </a:t>
+            </a:r>
+            <a:r>
+              <a:rPr lang="pt-PT" dirty="0" err="1" smtClean="0"/>
+              <a:t>Crossover</a:t>
+            </a:r>
+            <a:endParaRPr lang="pt-PT" dirty="0" smtClean="0"/>
+          </a:p>
+          <a:p>
+            <a:endParaRPr lang="pt-PT" dirty="0"/>
+          </a:p>
+          <a:p>
+            <a:r>
+              <a:rPr lang="pt-PT" dirty="0" smtClean="0"/>
+              <a:t>PMX</a:t>
+            </a:r>
+          </a:p>
+          <a:p>
+            <a:endParaRPr lang="pt-PT" dirty="0"/>
+          </a:p>
+        </p:txBody>
+      </p:sp>
+      <p:pic>
+        <p:nvPicPr>
+          <p:cNvPr id="2050" name="Picture 2"/>
+          <p:cNvPicPr>
+            <a:picLocks noChangeAspect="1" noChangeArrowheads="1"/>
+          </p:cNvPicPr>
+          <p:nvPr/>
+        </p:nvPicPr>
+        <p:blipFill>
+          <a:blip r:embed="rId2">
+            <a:extLst>
+              <a:ext uri="{28A0092B-C50C-407E-A947-70E740481C1C}">
+                <a14:useLocalDpi xmlns:a14="http://schemas.microsoft.com/office/drawing/2010/main" val="0"/>
+              </a:ext>
+            </a:extLst>
+          </a:blip>
+          <a:srcRect/>
+          <a:stretch>
+            <a:fillRect/>
+          </a:stretch>
+        </p:blipFill>
+        <p:spPr bwMode="auto">
+          <a:xfrm>
+            <a:off x="3707904" y="3429000"/>
+            <a:ext cx="4750096" cy="857051"/>
+          </a:xfrm>
+          <a:prstGeom prst="rect">
+            <a:avLst/>
+          </a:prstGeom>
+          <a:noFill/>
+          <a:ln>
+            <a:noFill/>
+          </a:ln>
+          <a:effectLst/>
+          <a:extLst>
+            <a:ext uri="{909E8E84-426E-40DD-AFC4-6F175D3DCCD1}">
+              <a14:hiddenFill xmlns:a14="http://schemas.microsoft.com/office/drawing/2010/main">
+                <a:solidFill>
+                  <a:schemeClr val="accent1"/>
+                </a:solidFill>
+              </a14:hiddenFill>
+            </a:ext>
+            <a:ext uri="{91240B29-F687-4F45-9708-019B960494DF}">
+              <a14:hiddenLine xmlns:a14="http://schemas.microsoft.com/office/drawing/2010/main" w="9525">
+                <a:solidFill>
+                  <a:schemeClr val="tx1"/>
+                </a:solidFill>
+                <a:miter lim="800000"/>
+                <a:headEnd/>
+                <a:tailEnd/>
+              </a14:hiddenLine>
+            </a:ext>
+            <a:ext uri="{AF507438-7753-43E0-B8FC-AC1667EBCBE1}">
+              <a14:hiddenEffects xmlns:a14="http://schemas.microsoft.com/office/drawing/2010/main">
+                <a:effectLst>
+                  <a:outerShdw dist="35921" dir="2700000" algn="ctr" rotWithShape="0">
+                    <a:schemeClr val="bg2"/>
+                  </a:outerShdw>
+                </a:effectLst>
+              </a14:hiddenEffects>
+            </a:ext>
+          </a:extLst>
+        </p:spPr>
+      </p:pic>
+      <p:pic>
+        <p:nvPicPr>
+          <p:cNvPr id="2051" name="Picture 3"/>
+          <p:cNvPicPr>
+            <a:picLocks noChangeAspect="1" noChangeArrowheads="1"/>
+          </p:cNvPicPr>
+          <p:nvPr/>
+        </p:nvPicPr>
+        <p:blipFill>
+          <a:blip r:embed="rId3">
+            <a:extLst>
+              <a:ext uri="{28A0092B-C50C-407E-A947-70E740481C1C}">
+                <a14:useLocalDpi xmlns:a14="http://schemas.microsoft.com/office/drawing/2010/main" val="0"/>
+              </a:ext>
+            </a:extLst>
+          </a:blip>
+          <a:srcRect/>
+          <a:stretch>
+            <a:fillRect/>
+          </a:stretch>
+        </p:blipFill>
+        <p:spPr bwMode="auto">
+          <a:xfrm>
+            <a:off x="3673490" y="4824185"/>
+            <a:ext cx="4750096" cy="1128375"/>
+          </a:xfrm>
+          <a:prstGeom prst="rect">
+            <a:avLst/>
+          </a:prstGeom>
+          <a:noFill/>
+          <a:ln>
+            <a:noFill/>
+          </a:ln>
+          <a:effectLst/>
+          <a:extLst>
+            <a:ext uri="{909E8E84-426E-40DD-AFC4-6F175D3DCCD1}">
+              <a14:hiddenFill xmlns:a14="http://schemas.microsoft.com/office/drawing/2010/main">
+                <a:solidFill>
+                  <a:schemeClr val="accent1"/>
+                </a:solidFill>
+              </a14:hiddenFill>
+            </a:ext>
+            <a:ext uri="{91240B29-F687-4F45-9708-019B960494DF}">
+              <a14:hiddenLine xmlns:a14="http://schemas.microsoft.com/office/drawing/2010/main" w="9525">
+                <a:solidFill>
+                  <a:schemeClr val="tx1"/>
+                </a:solidFill>
+                <a:miter lim="800000"/>
+                <a:headEnd/>
+                <a:tailEnd/>
+              </a14:hiddenLine>
+            </a:ext>
+            <a:ext uri="{AF507438-7753-43E0-B8FC-AC1667EBCBE1}">
+              <a14:hiddenEffects xmlns:a14="http://schemas.microsoft.com/office/drawing/2010/main">
+                <a:effectLst>
+                  <a:outerShdw dist="35921" dir="2700000" algn="ctr" rotWithShape="0">
+                    <a:schemeClr val="bg2"/>
+                  </a:outerShdw>
+                </a:effectLst>
+              </a14:hiddenEffects>
+            </a:ext>
+          </a:extLst>
+        </p:spPr>
+      </p:pic>
+    </p:spTree>
+    <p:extLst>
+      <p:ext uri="{BB962C8B-B14F-4D97-AF65-F5344CB8AC3E}">
+        <p14:creationId xmlns:p14="http://schemas.microsoft.com/office/powerpoint/2010/main" val="852166605"/>
       </p:ext>
     </p:extLst>
   </p:cSld>

</xml_diff>